<commit_message>
polished yeast exp figures
</commit_message>
<xml_diff>
--- a/drug_data/drug_data_reanalysis.pptx
+++ b/drug_data/drug_data_reanalysis.pptx
@@ -5,7 +5,7 @@
     <p:sldMasterId id="2147483648" r:id="rId1"/>
   </p:sldMasterIdLst>
   <p:notesMasterIdLst>
-    <p:notesMasterId r:id="rId16"/>
+    <p:notesMasterId r:id="rId17"/>
   </p:notesMasterIdLst>
   <p:sldIdLst>
     <p:sldId id="256" r:id="rId2"/>
@@ -22,6 +22,7 @@
     <p:sldId id="266" r:id="rId13"/>
     <p:sldId id="261" r:id="rId14"/>
     <p:sldId id="269" r:id="rId15"/>
+    <p:sldId id="270" r:id="rId16"/>
   </p:sldIdLst>
   <p:sldSz cx="12192000" cy="6858000"/>
   <p:notesSz cx="6858000" cy="9144000"/>
@@ -221,7 +222,7 @@
           <a:p>
             <a:fld id="{56041344-4514-DF47-854A-62330FF8B009}" type="datetimeFigureOut">
               <a:rPr lang="en-US" smtClean="0"/>
-              <a:t>6/23/22</a:t>
+              <a:t>10/25/22</a:t>
             </a:fld>
             <a:endParaRPr lang="en-US"/>
           </a:p>
@@ -896,7 +897,7 @@
           <a:p>
             <a:fld id="{969DC319-9076-C343-B595-206709831AE2}" type="datetimeFigureOut">
               <a:rPr lang="en-US" smtClean="0"/>
-              <a:t>6/19/22</a:t>
+              <a:t>10/25/22</a:t>
             </a:fld>
             <a:endParaRPr lang="en-US"/>
           </a:p>
@@ -1094,7 +1095,7 @@
           <a:p>
             <a:fld id="{969DC319-9076-C343-B595-206709831AE2}" type="datetimeFigureOut">
               <a:rPr lang="en-US" smtClean="0"/>
-              <a:t>6/19/22</a:t>
+              <a:t>10/25/22</a:t>
             </a:fld>
             <a:endParaRPr lang="en-US"/>
           </a:p>
@@ -1302,7 +1303,7 @@
           <a:p>
             <a:fld id="{969DC319-9076-C343-B595-206709831AE2}" type="datetimeFigureOut">
               <a:rPr lang="en-US" smtClean="0"/>
-              <a:t>6/19/22</a:t>
+              <a:t>10/25/22</a:t>
             </a:fld>
             <a:endParaRPr lang="en-US"/>
           </a:p>
@@ -1500,7 +1501,7 @@
           <a:p>
             <a:fld id="{969DC319-9076-C343-B595-206709831AE2}" type="datetimeFigureOut">
               <a:rPr lang="en-US" smtClean="0"/>
-              <a:t>6/19/22</a:t>
+              <a:t>10/25/22</a:t>
             </a:fld>
             <a:endParaRPr lang="en-US"/>
           </a:p>
@@ -1775,7 +1776,7 @@
           <a:p>
             <a:fld id="{969DC319-9076-C343-B595-206709831AE2}" type="datetimeFigureOut">
               <a:rPr lang="en-US" smtClean="0"/>
-              <a:t>6/19/22</a:t>
+              <a:t>10/25/22</a:t>
             </a:fld>
             <a:endParaRPr lang="en-US"/>
           </a:p>
@@ -2040,7 +2041,7 @@
           <a:p>
             <a:fld id="{969DC319-9076-C343-B595-206709831AE2}" type="datetimeFigureOut">
               <a:rPr lang="en-US" smtClean="0"/>
-              <a:t>6/19/22</a:t>
+              <a:t>10/25/22</a:t>
             </a:fld>
             <a:endParaRPr lang="en-US"/>
           </a:p>
@@ -2452,7 +2453,7 @@
           <a:p>
             <a:fld id="{969DC319-9076-C343-B595-206709831AE2}" type="datetimeFigureOut">
               <a:rPr lang="en-US" smtClean="0"/>
-              <a:t>6/19/22</a:t>
+              <a:t>10/25/22</a:t>
             </a:fld>
             <a:endParaRPr lang="en-US"/>
           </a:p>
@@ -2593,7 +2594,7 @@
           <a:p>
             <a:fld id="{969DC319-9076-C343-B595-206709831AE2}" type="datetimeFigureOut">
               <a:rPr lang="en-US" smtClean="0"/>
-              <a:t>6/19/22</a:t>
+              <a:t>10/25/22</a:t>
             </a:fld>
             <a:endParaRPr lang="en-US"/>
           </a:p>
@@ -2706,7 +2707,7 @@
           <a:p>
             <a:fld id="{969DC319-9076-C343-B595-206709831AE2}" type="datetimeFigureOut">
               <a:rPr lang="en-US" smtClean="0"/>
-              <a:t>6/19/22</a:t>
+              <a:t>10/25/22</a:t>
             </a:fld>
             <a:endParaRPr lang="en-US"/>
           </a:p>
@@ -3017,7 +3018,7 @@
           <a:p>
             <a:fld id="{969DC319-9076-C343-B595-206709831AE2}" type="datetimeFigureOut">
               <a:rPr lang="en-US" smtClean="0"/>
-              <a:t>6/19/22</a:t>
+              <a:t>10/25/22</a:t>
             </a:fld>
             <a:endParaRPr lang="en-US"/>
           </a:p>
@@ -3305,7 +3306,7 @@
           <a:p>
             <a:fld id="{969DC319-9076-C343-B595-206709831AE2}" type="datetimeFigureOut">
               <a:rPr lang="en-US" smtClean="0"/>
-              <a:t>6/19/22</a:t>
+              <a:t>10/25/22</a:t>
             </a:fld>
             <a:endParaRPr lang="en-US"/>
           </a:p>
@@ -3546,7 +3547,7 @@
           <a:p>
             <a:fld id="{969DC319-9076-C343-B595-206709831AE2}" type="datetimeFigureOut">
               <a:rPr lang="en-US" smtClean="0"/>
-              <a:t>6/19/22</a:t>
+              <a:t>10/25/22</a:t>
             </a:fld>
             <a:endParaRPr lang="en-US"/>
           </a:p>
@@ -4100,8 +4101,8 @@
           </a:p>
         </p:txBody>
       </p:sp>
-      <mc:AlternateContent xmlns:mc="http://schemas.openxmlformats.org/markup-compatibility/2006">
-        <mc:Choice xmlns:a14="http://schemas.microsoft.com/office/drawing/2010/main" Requires="a14">
+      <mc:AlternateContent xmlns:mc="http://schemas.openxmlformats.org/markup-compatibility/2006" xmlns:a14="http://schemas.microsoft.com/office/drawing/2010/main">
+        <mc:Choice Requires="a14">
           <p:sp>
             <p:nvSpPr>
               <p:cNvPr id="9" name="TextBox 8">
@@ -4485,13 +4486,7 @@
                           <a:rPr lang="en-US" i="1">
                             <a:latin typeface="Cambria Math" panose="02040503050406030204" pitchFamily="18" charset="0"/>
                           </a:rPr>
-                          <m:t>1</m:t>
-                        </m:r>
-                        <m:r>
-                          <a:rPr lang="en-US" i="1">
-                            <a:latin typeface="Cambria Math" panose="02040503050406030204" pitchFamily="18" charset="0"/>
-                          </a:rPr>
-                          <m:t>2</m:t>
+                          <m:t>12</m:t>
                         </m:r>
                         <m:r>
                           <a:rPr lang="en-US" b="0" i="1" smtClean="0">
@@ -4589,13 +4584,7 @@
                           <a:rPr lang="en-US" i="1">
                             <a:latin typeface="Cambria Math" panose="02040503050406030204" pitchFamily="18" charset="0"/>
                           </a:rPr>
-                          <m:t>1</m:t>
-                        </m:r>
-                        <m:r>
-                          <a:rPr lang="en-US" i="1">
-                            <a:latin typeface="Cambria Math" panose="02040503050406030204" pitchFamily="18" charset="0"/>
-                          </a:rPr>
-                          <m:t>23</m:t>
+                          <m:t>123</m:t>
                         </m:r>
                         <m:r>
                           <a:rPr lang="en-US" b="0" i="1" smtClean="0">
@@ -4612,7 +4601,7 @@
             </p:txBody>
           </p:sp>
         </mc:Choice>
-        <mc:Fallback>
+        <mc:Fallback xmlns="">
           <p:sp>
             <p:nvSpPr>
               <p:cNvPr id="9" name="TextBox 8">
@@ -4657,8 +4646,8 @@
           </p:sp>
         </mc:Fallback>
       </mc:AlternateContent>
-      <mc:AlternateContent xmlns:mc="http://schemas.openxmlformats.org/markup-compatibility/2006">
-        <mc:Choice xmlns:a14="http://schemas.microsoft.com/office/drawing/2010/main" Requires="a14">
+      <mc:AlternateContent xmlns:mc="http://schemas.openxmlformats.org/markup-compatibility/2006" xmlns:a14="http://schemas.microsoft.com/office/drawing/2010/main">
+        <mc:Choice Requires="a14">
           <p:sp>
             <p:nvSpPr>
               <p:cNvPr id="10" name="TextBox 9">
@@ -4687,6 +4676,7 @@
               </a:bodyPr>
               <a:lstStyle/>
               <a:p>
+                <a:pPr/>
                 <a14:m>
                   <m:oMathPara xmlns:m="http://schemas.openxmlformats.org/officeDocument/2006/math">
                     <m:oMathParaPr>
@@ -4714,13 +4704,7 @@
                             <a:rPr lang="en-US" i="1">
                               <a:latin typeface="Cambria Math" panose="02040503050406030204" pitchFamily="18" charset="0"/>
                             </a:rPr>
-                            <m:t>123</m:t>
-                          </m:r>
-                          <m:r>
-                            <a:rPr lang="en-US" i="1">
-                              <a:latin typeface="Cambria Math" panose="02040503050406030204" pitchFamily="18" charset="0"/>
-                            </a:rPr>
-                            <m:t>4</m:t>
+                            <m:t>1234</m:t>
                           </m:r>
                         </m:sub>
                       </m:sSub>
@@ -5180,7 +5164,7 @@
             </p:txBody>
           </p:sp>
         </mc:Choice>
-        <mc:Fallback>
+        <mc:Fallback xmlns="">
           <p:sp>
             <p:nvSpPr>
               <p:cNvPr id="10" name="TextBox 9">
@@ -5225,8 +5209,8 @@
           </p:sp>
         </mc:Fallback>
       </mc:AlternateContent>
-      <mc:AlternateContent xmlns:mc="http://schemas.openxmlformats.org/markup-compatibility/2006">
-        <mc:Choice xmlns:a14="http://schemas.microsoft.com/office/drawing/2010/main" Requires="a14">
+      <mc:AlternateContent xmlns:mc="http://schemas.openxmlformats.org/markup-compatibility/2006" xmlns:a14="http://schemas.microsoft.com/office/drawing/2010/main">
+        <mc:Choice Requires="a14">
           <p:sp>
             <p:nvSpPr>
               <p:cNvPr id="12" name="TextBox 11">
@@ -5306,7 +5290,7 @@
             </p:txBody>
           </p:sp>
         </mc:Choice>
-        <mc:Fallback>
+        <mc:Fallback xmlns="">
           <p:sp>
             <p:nvSpPr>
               <p:cNvPr id="12" name="TextBox 11">
@@ -5351,8 +5335,8 @@
           </p:sp>
         </mc:Fallback>
       </mc:AlternateContent>
-      <mc:AlternateContent xmlns:mc="http://schemas.openxmlformats.org/markup-compatibility/2006">
-        <mc:Choice xmlns:a14="http://schemas.microsoft.com/office/drawing/2010/main" Requires="a14">
+      <mc:AlternateContent xmlns:mc="http://schemas.openxmlformats.org/markup-compatibility/2006" xmlns:a14="http://schemas.microsoft.com/office/drawing/2010/main">
+        <mc:Choice Requires="a14">
           <p:sp>
             <p:nvSpPr>
               <p:cNvPr id="14" name="TextBox 13">
@@ -5381,6 +5365,7 @@
               </a:bodyPr>
               <a:lstStyle/>
               <a:p>
+                <a:pPr/>
                 <a14:m>
                   <m:oMathPara xmlns:m="http://schemas.openxmlformats.org/officeDocument/2006/math">
                     <m:oMathParaPr>
@@ -5549,13 +5534,7 @@
                                         <a:rPr lang="en-US" i="1">
                                           <a:latin typeface="Cambria Math" panose="02040503050406030204" pitchFamily="18" charset="0"/>
                                         </a:rPr>
-                                        <m:t>𝑖</m:t>
-                                      </m:r>
-                                      <m:r>
-                                        <a:rPr lang="en-US" i="1">
-                                          <a:latin typeface="Cambria Math" panose="02040503050406030204" pitchFamily="18" charset="0"/>
-                                        </a:rPr>
-                                        <m:t>𝑗</m:t>
+                                        <m:t>𝑖𝑗</m:t>
                                       </m:r>
                                     </m:sub>
                                   </m:sSub>
@@ -5647,13 +5626,7 @@
                                         <a:rPr lang="en-US" i="1">
                                           <a:latin typeface="Cambria Math" panose="02040503050406030204" pitchFamily="18" charset="0"/>
                                         </a:rPr>
-                                        <m:t>𝑖𝑗</m:t>
-                                      </m:r>
-                                      <m:r>
-                                        <a:rPr lang="en-US" i="1">
-                                          <a:latin typeface="Cambria Math" panose="02040503050406030204" pitchFamily="18" charset="0"/>
-                                        </a:rPr>
-                                        <m:t>𝑘</m:t>
+                                        <m:t>𝑖𝑗𝑘</m:t>
                                       </m:r>
                                     </m:sub>
                                   </m:sSub>
@@ -5684,13 +5657,7 @@
                             <a:rPr lang="en-US" i="1">
                               <a:latin typeface="Cambria Math" panose="02040503050406030204" pitchFamily="18" charset="0"/>
                             </a:rPr>
-                            <m:t>123</m:t>
-                          </m:r>
-                          <m:r>
-                            <a:rPr lang="en-US" i="1">
-                              <a:latin typeface="Cambria Math" panose="02040503050406030204" pitchFamily="18" charset="0"/>
-                            </a:rPr>
-                            <m:t>4</m:t>
+                            <m:t>1234</m:t>
                           </m:r>
                         </m:sub>
                       </m:sSub>
@@ -5702,7 +5669,7 @@
             </p:txBody>
           </p:sp>
         </mc:Choice>
-        <mc:Fallback>
+        <mc:Fallback xmlns="">
           <p:sp>
             <p:nvSpPr>
               <p:cNvPr id="14" name="TextBox 13">
@@ -5907,8 +5874,8 @@
           </a:p>
         </p:txBody>
       </p:sp>
-      <mc:AlternateContent xmlns:mc="http://schemas.openxmlformats.org/markup-compatibility/2006">
-        <mc:Choice xmlns:a14="http://schemas.microsoft.com/office/drawing/2010/main" Requires="a14">
+      <mc:AlternateContent xmlns:mc="http://schemas.openxmlformats.org/markup-compatibility/2006" xmlns:a14="http://schemas.microsoft.com/office/drawing/2010/main">
+        <mc:Choice Requires="a14">
           <p:sp>
             <p:nvSpPr>
               <p:cNvPr id="9" name="TextBox 8">
@@ -6237,13 +6204,7 @@
                               <a:rPr lang="en-US" i="1">
                                 <a:latin typeface="Cambria Math" panose="02040503050406030204" pitchFamily="18" charset="0"/>
                               </a:rPr>
-                              <m:t>2</m:t>
-                            </m:r>
-                            <m:r>
-                              <a:rPr lang="en-US" i="1">
-                                <a:latin typeface="Cambria Math" panose="02040503050406030204" pitchFamily="18" charset="0"/>
-                              </a:rPr>
-                              <m:t>4</m:t>
+                              <m:t>24</m:t>
                             </m:r>
                           </m:sub>
                         </m:sSub>
@@ -6828,13 +6789,7 @@
                           <a:rPr lang="en-US" i="1">
                             <a:latin typeface="Cambria Math" panose="02040503050406030204" pitchFamily="18" charset="0"/>
                           </a:rPr>
-                          <m:t>123</m:t>
-                        </m:r>
-                        <m:r>
-                          <a:rPr lang="en-US" i="1">
-                            <a:latin typeface="Cambria Math" panose="02040503050406030204" pitchFamily="18" charset="0"/>
-                          </a:rPr>
-                          <m:t>4</m:t>
+                          <m:t>1234</m:t>
                         </m:r>
                         <m:r>
                           <a:rPr lang="en-US" b="0" i="1" smtClean="0">
@@ -6851,7 +6806,7 @@
             </p:txBody>
           </p:sp>
         </mc:Choice>
-        <mc:Fallback>
+        <mc:Fallback xmlns="">
           <p:sp>
             <p:nvSpPr>
               <p:cNvPr id="9" name="TextBox 8">
@@ -6896,8 +6851,8 @@
           </p:sp>
         </mc:Fallback>
       </mc:AlternateContent>
-      <mc:AlternateContent xmlns:mc="http://schemas.openxmlformats.org/markup-compatibility/2006">
-        <mc:Choice xmlns:a14="http://schemas.microsoft.com/office/drawing/2010/main" Requires="a14">
+      <mc:AlternateContent xmlns:mc="http://schemas.openxmlformats.org/markup-compatibility/2006" xmlns:a14="http://schemas.microsoft.com/office/drawing/2010/main">
+        <mc:Choice Requires="a14">
           <p:sp>
             <p:nvSpPr>
               <p:cNvPr id="10" name="TextBox 9">
@@ -7006,13 +6961,7 @@
                                 <a:rPr lang="en-US" i="1">
                                   <a:latin typeface="Cambria Math" panose="02040503050406030204" pitchFamily="18" charset="0"/>
                                 </a:rPr>
-                                <m:t>1234</m:t>
-                              </m:r>
-                              <m:r>
-                                <a:rPr lang="en-US" i="1">
-                                  <a:latin typeface="Cambria Math" panose="02040503050406030204" pitchFamily="18" charset="0"/>
-                                </a:rPr>
-                                <m:t>5</m:t>
+                                <m:t>12345</m:t>
                               </m:r>
                             </m:sub>
                           </m:sSub>
@@ -7180,13 +7129,7 @@
                                 <a:rPr lang="en-US" i="1">
                                   <a:latin typeface="Cambria Math" panose="02040503050406030204" pitchFamily="18" charset="0"/>
                                 </a:rPr>
-                                <m:t>1</m:t>
-                              </m:r>
-                              <m:r>
-                                <a:rPr lang="en-US" i="1">
-                                  <a:latin typeface="Cambria Math" panose="02040503050406030204" pitchFamily="18" charset="0"/>
-                                </a:rPr>
-                                <m:t>23</m:t>
+                                <m:t>123</m:t>
                               </m:r>
                             </m:sub>
                           </m:sSub>
@@ -7211,13 +7154,7 @@
                                 <a:rPr lang="en-US" i="1">
                                   <a:latin typeface="Cambria Math" panose="02040503050406030204" pitchFamily="18" charset="0"/>
                                 </a:rPr>
-                                <m:t>12</m:t>
-                              </m:r>
-                              <m:r>
-                                <a:rPr lang="en-US" i="1">
-                                  <a:latin typeface="Cambria Math" panose="02040503050406030204" pitchFamily="18" charset="0"/>
-                                </a:rPr>
-                                <m:t>4</m:t>
+                                <m:t>124</m:t>
                               </m:r>
                             </m:sub>
                           </m:sSub>
@@ -7251,13 +7188,7 @@
                                     <a:rPr lang="en-US" i="1">
                                       <a:latin typeface="Cambria Math" panose="02040503050406030204" pitchFamily="18" charset="0"/>
                                     </a:rPr>
-                                    <m:t>12</m:t>
-                                  </m:r>
-                                  <m:r>
-                                    <a:rPr lang="en-US" i="1">
-                                      <a:latin typeface="Cambria Math" panose="02040503050406030204" pitchFamily="18" charset="0"/>
-                                    </a:rPr>
-                                    <m:t>5</m:t>
+                                    <m:t>125</m:t>
                                   </m:r>
                                 </m:sub>
                               </m:sSub>
@@ -7273,13 +7204,7 @@
                                 <a:rPr lang="en-US" i="1">
                                   <a:latin typeface="Cambria Math" panose="02040503050406030204" pitchFamily="18" charset="0"/>
                                 </a:rPr>
-                                <m:t>1</m:t>
-                              </m:r>
-                              <m:r>
-                                <a:rPr lang="en-US" i="1">
-                                  <a:latin typeface="Cambria Math" panose="02040503050406030204" pitchFamily="18" charset="0"/>
-                                </a:rPr>
-                                <m:t>34</m:t>
+                                <m:t>134</m:t>
                               </m:r>
                             </m:sub>
                           </m:sSub>
@@ -7304,13 +7229,7 @@
                                 <a:rPr lang="en-US" i="1">
                                   <a:latin typeface="Cambria Math" panose="02040503050406030204" pitchFamily="18" charset="0"/>
                                 </a:rPr>
-                                <m:t>1</m:t>
-                              </m:r>
-                              <m:r>
-                                <a:rPr lang="en-US" i="1">
-                                  <a:latin typeface="Cambria Math" panose="02040503050406030204" pitchFamily="18" charset="0"/>
-                                </a:rPr>
-                                <m:t>35</m:t>
+                                <m:t>135</m:t>
                               </m:r>
                             </m:sub>
                           </m:sSub>
@@ -7335,13 +7254,7 @@
                                 <a:rPr lang="en-US" i="1">
                                   <a:latin typeface="Cambria Math" panose="02040503050406030204" pitchFamily="18" charset="0"/>
                                 </a:rPr>
-                                <m:t>1</m:t>
-                              </m:r>
-                              <m:r>
-                                <a:rPr lang="en-US" i="1">
-                                  <a:latin typeface="Cambria Math" panose="02040503050406030204" pitchFamily="18" charset="0"/>
-                                </a:rPr>
-                                <m:t>45</m:t>
+                                <m:t>145</m:t>
                               </m:r>
                             </m:sub>
                           </m:sSub>
@@ -7485,13 +7398,7 @@
                                 <a:rPr lang="en-US" i="1">
                                   <a:latin typeface="Cambria Math" panose="02040503050406030204" pitchFamily="18" charset="0"/>
                                 </a:rPr>
-                                <m:t>1</m:t>
-                              </m:r>
-                              <m:r>
-                                <a:rPr lang="en-US" i="1">
-                                  <a:latin typeface="Cambria Math" panose="02040503050406030204" pitchFamily="18" charset="0"/>
-                                </a:rPr>
-                                <m:t>2</m:t>
+                                <m:t>12</m:t>
                               </m:r>
                             </m:sub>
                           </m:sSub>
@@ -7566,13 +7473,7 @@
                                 <a:rPr lang="en-US" i="1">
                                   <a:latin typeface="Cambria Math" panose="02040503050406030204" pitchFamily="18" charset="0"/>
                                 </a:rPr>
-                                <m:t>1</m:t>
-                              </m:r>
-                              <m:r>
-                                <a:rPr lang="en-US" i="1">
-                                  <a:latin typeface="Cambria Math" panose="02040503050406030204" pitchFamily="18" charset="0"/>
-                                </a:rPr>
-                                <m:t>5</m:t>
+                                <m:t>15</m:t>
                               </m:r>
                             </m:sub>
                           </m:sSub>
@@ -7656,13 +7557,7 @@
                                     <a:rPr lang="en-US" i="1">
                                       <a:latin typeface="Cambria Math" panose="02040503050406030204" pitchFamily="18" charset="0"/>
                                     </a:rPr>
-                                    <m:t>2</m:t>
-                                  </m:r>
-                                  <m:r>
-                                    <a:rPr lang="en-US" i="1">
-                                      <a:latin typeface="Cambria Math" panose="02040503050406030204" pitchFamily="18" charset="0"/>
-                                    </a:rPr>
-                                    <m:t>5</m:t>
+                                    <m:t>25</m:t>
                                   </m:r>
                                 </m:sub>
                               </m:sSub>
@@ -7678,13 +7573,7 @@
                                 <a:rPr lang="en-US" i="1">
                                   <a:latin typeface="Cambria Math" panose="02040503050406030204" pitchFamily="18" charset="0"/>
                                 </a:rPr>
-                                <m:t>3</m:t>
-                              </m:r>
-                              <m:r>
-                                <a:rPr lang="en-US" i="1">
-                                  <a:latin typeface="Cambria Math" panose="02040503050406030204" pitchFamily="18" charset="0"/>
-                                </a:rPr>
-                                <m:t>4</m:t>
+                                <m:t>34</m:t>
                               </m:r>
                             </m:sub>
                           </m:sSub>
@@ -7765,13 +7654,7 @@
                                 <a:rPr lang="en-US" i="1">
                                   <a:latin typeface="Cambria Math" panose="02040503050406030204" pitchFamily="18" charset="0"/>
                                 </a:rPr>
-                                <m:t>123</m:t>
-                              </m:r>
-                              <m:r>
-                                <a:rPr lang="en-US" i="1">
-                                  <a:latin typeface="Cambria Math" panose="02040503050406030204" pitchFamily="18" charset="0"/>
-                                </a:rPr>
-                                <m:t>4</m:t>
+                                <m:t>1234</m:t>
                               </m:r>
                             </m:sub>
                           </m:sSub>
@@ -7796,13 +7679,7 @@
                                 <a:rPr lang="en-US" i="1">
                                   <a:latin typeface="Cambria Math" panose="02040503050406030204" pitchFamily="18" charset="0"/>
                                 </a:rPr>
-                                <m:t>123</m:t>
-                              </m:r>
-                              <m:r>
-                                <a:rPr lang="en-US" i="1">
-                                  <a:latin typeface="Cambria Math" panose="02040503050406030204" pitchFamily="18" charset="0"/>
-                                </a:rPr>
-                                <m:t>5</m:t>
+                                <m:t>1235</m:t>
                               </m:r>
                             </m:sub>
                           </m:sSub>
@@ -7827,13 +7704,7 @@
                                 <a:rPr lang="en-US" i="1">
                                   <a:latin typeface="Cambria Math" panose="02040503050406030204" pitchFamily="18" charset="0"/>
                                 </a:rPr>
-                                <m:t>12</m:t>
-                              </m:r>
-                              <m:r>
-                                <a:rPr lang="en-US" i="1">
-                                  <a:latin typeface="Cambria Math" panose="02040503050406030204" pitchFamily="18" charset="0"/>
-                                </a:rPr>
-                                <m:t>45</m:t>
+                                <m:t>1245</m:t>
                               </m:r>
                             </m:sub>
                           </m:sSub>
@@ -7858,13 +7729,7 @@
                                 <a:rPr lang="en-US" i="1">
                                   <a:latin typeface="Cambria Math" panose="02040503050406030204" pitchFamily="18" charset="0"/>
                                 </a:rPr>
-                                <m:t>1</m:t>
-                              </m:r>
-                              <m:r>
-                                <a:rPr lang="en-US" i="1">
-                                  <a:latin typeface="Cambria Math" panose="02040503050406030204" pitchFamily="18" charset="0"/>
-                                </a:rPr>
-                                <m:t>345</m:t>
+                                <m:t>1345</m:t>
                               </m:r>
                             </m:sub>
                           </m:sSub>
@@ -7909,7 +7774,7 @@
             </p:txBody>
           </p:sp>
         </mc:Choice>
-        <mc:Fallback>
+        <mc:Fallback xmlns="">
           <p:sp>
             <p:nvSpPr>
               <p:cNvPr id="10" name="TextBox 9">
@@ -7954,8 +7819,8 @@
           </p:sp>
         </mc:Fallback>
       </mc:AlternateContent>
-      <mc:AlternateContent xmlns:mc="http://schemas.openxmlformats.org/markup-compatibility/2006">
-        <mc:Choice xmlns:a14="http://schemas.microsoft.com/office/drawing/2010/main" Requires="a14">
+      <mc:AlternateContent xmlns:mc="http://schemas.openxmlformats.org/markup-compatibility/2006" xmlns:a14="http://schemas.microsoft.com/office/drawing/2010/main">
+        <mc:Choice Requires="a14">
           <p:sp>
             <p:nvSpPr>
               <p:cNvPr id="12" name="TextBox 11">
@@ -8054,7 +7919,7 @@
             </p:txBody>
           </p:sp>
         </mc:Choice>
-        <mc:Fallback>
+        <mc:Fallback xmlns="">
           <p:sp>
             <p:nvSpPr>
               <p:cNvPr id="12" name="TextBox 11">
@@ -8099,8 +7964,8 @@
           </p:sp>
         </mc:Fallback>
       </mc:AlternateContent>
-      <mc:AlternateContent xmlns:mc="http://schemas.openxmlformats.org/markup-compatibility/2006">
-        <mc:Choice xmlns:a14="http://schemas.microsoft.com/office/drawing/2010/main" Requires="a14">
+      <mc:AlternateContent xmlns:mc="http://schemas.openxmlformats.org/markup-compatibility/2006" xmlns:a14="http://schemas.microsoft.com/office/drawing/2010/main">
+        <mc:Choice Requires="a14">
           <p:sp>
             <p:nvSpPr>
               <p:cNvPr id="14" name="TextBox 13">
@@ -8157,13 +8022,7 @@
                             <a:rPr lang="en-US" b="0" i="1" smtClean="0">
                               <a:latin typeface="Cambria Math" panose="02040503050406030204" pitchFamily="18" charset="0"/>
                             </a:rPr>
-                            <m:t>1234</m:t>
-                          </m:r>
-                          <m:r>
-                            <a:rPr lang="en-US" b="0" i="1" smtClean="0">
-                              <a:latin typeface="Cambria Math" panose="02040503050406030204" pitchFamily="18" charset="0"/>
-                            </a:rPr>
-                            <m:t>5</m:t>
+                            <m:t>12345</m:t>
                           </m:r>
                         </m:sub>
                       </m:sSub>
@@ -8548,7 +8407,7 @@
             </p:txBody>
           </p:sp>
         </mc:Choice>
-        <mc:Fallback>
+        <mc:Fallback xmlns="">
           <p:sp>
             <p:nvSpPr>
               <p:cNvPr id="14" name="TextBox 13">
@@ -8824,6 +8683,89 @@
     <p:extLst>
       <p:ext uri="{BB962C8B-B14F-4D97-AF65-F5344CB8AC3E}">
         <p14:creationId xmlns:p14="http://schemas.microsoft.com/office/powerpoint/2010/main" val="3859436327"/>
+      </p:ext>
+    </p:extLst>
+  </p:cSld>
+  <p:clrMapOvr>
+    <a:masterClrMapping/>
+  </p:clrMapOvr>
+</p:sld>
+</file>
+
+<file path=ppt/slides/slide15.xml><?xml version="1.0" encoding="utf-8"?>
+<p:sld xmlns:a="http://schemas.openxmlformats.org/drawingml/2006/main" xmlns:r="http://schemas.openxmlformats.org/officeDocument/2006/relationships" xmlns:p="http://schemas.openxmlformats.org/presentationml/2006/main">
+  <p:cSld>
+    <p:spTree>
+      <p:nvGrpSpPr>
+        <p:cNvPr id="1" name=""/>
+        <p:cNvGrpSpPr/>
+        <p:nvPr/>
+      </p:nvGrpSpPr>
+      <p:grpSpPr>
+        <a:xfrm>
+          <a:off x="0" y="0"/>
+          <a:ext cx="0" cy="0"/>
+          <a:chOff x="0" y="0"/>
+          <a:chExt cx="0" cy="0"/>
+        </a:xfrm>
+      </p:grpSpPr>
+      <p:sp>
+        <p:nvSpPr>
+          <p:cNvPr id="2" name="Title 1">
+            <a:extLst>
+              <a:ext uri="{FF2B5EF4-FFF2-40B4-BE49-F238E27FC236}">
+                <a16:creationId xmlns:a16="http://schemas.microsoft.com/office/drawing/2014/main" id="{31F3F9F0-5348-B8E9-A9BD-62A241012847}"/>
+              </a:ext>
+            </a:extLst>
+          </p:cNvPr>
+          <p:cNvSpPr>
+            <a:spLocks noGrp="1"/>
+          </p:cNvSpPr>
+          <p:nvPr>
+            <p:ph type="title"/>
+          </p:nvPr>
+        </p:nvSpPr>
+        <p:spPr/>
+        <p:txBody>
+          <a:bodyPr/>
+          <a:lstStyle/>
+          <a:p>
+            <a:r>
+              <a:rPr lang="en-US" dirty="0"/>
+              <a:t>Drug response lit review</a:t>
+            </a:r>
+          </a:p>
+        </p:txBody>
+      </p:sp>
+      <p:sp>
+        <p:nvSpPr>
+          <p:cNvPr id="3" name="Content Placeholder 2">
+            <a:extLst>
+              <a:ext uri="{FF2B5EF4-FFF2-40B4-BE49-F238E27FC236}">
+                <a16:creationId xmlns:a16="http://schemas.microsoft.com/office/drawing/2014/main" id="{D5C1D9D0-713E-DE0C-4C33-B4FD78EED111}"/>
+              </a:ext>
+            </a:extLst>
+          </p:cNvPr>
+          <p:cNvSpPr>
+            <a:spLocks noGrp="1"/>
+          </p:cNvSpPr>
+          <p:nvPr>
+            <p:ph idx="1"/>
+          </p:nvPr>
+        </p:nvSpPr>
+        <p:spPr/>
+        <p:txBody>
+          <a:bodyPr/>
+          <a:lstStyle/>
+          <a:p>
+            <a:endParaRPr lang="en-US"/>
+          </a:p>
+        </p:txBody>
+      </p:sp>
+    </p:spTree>
+    <p:extLst>
+      <p:ext uri="{BB962C8B-B14F-4D97-AF65-F5344CB8AC3E}">
+        <p14:creationId xmlns:p14="http://schemas.microsoft.com/office/powerpoint/2010/main" val="4170676783"/>
       </p:ext>
     </p:extLst>
   </p:cSld>

</xml_diff>

<commit_message>
drug additive model, updated figs
</commit_message>
<xml_diff>
--- a/drug_data/drug_data_reanalysis.pptx
+++ b/drug_data/drug_data_reanalysis.pptx
@@ -5,7 +5,7 @@
     <p:sldMasterId id="2147483648" r:id="rId1"/>
   </p:sldMasterIdLst>
   <p:notesMasterIdLst>
-    <p:notesMasterId r:id="rId17"/>
+    <p:notesMasterId r:id="rId22"/>
   </p:notesMasterIdLst>
   <p:sldIdLst>
     <p:sldId id="256" r:id="rId2"/>
@@ -23,6 +23,11 @@
     <p:sldId id="261" r:id="rId14"/>
     <p:sldId id="269" r:id="rId15"/>
     <p:sldId id="270" r:id="rId16"/>
+    <p:sldId id="273" r:id="rId17"/>
+    <p:sldId id="275" r:id="rId18"/>
+    <p:sldId id="271" r:id="rId19"/>
+    <p:sldId id="272" r:id="rId20"/>
+    <p:sldId id="274" r:id="rId21"/>
   </p:sldIdLst>
   <p:sldSz cx="12192000" cy="6858000"/>
   <p:notesSz cx="6858000" cy="9144000"/>
@@ -8725,7 +8730,12 @@
             <p:ph type="title"/>
           </p:nvPr>
         </p:nvSpPr>
-        <p:spPr/>
+        <p:spPr>
+          <a:xfrm>
+            <a:off x="0" y="18255"/>
+            <a:ext cx="10515600" cy="840161"/>
+          </a:xfrm>
+        </p:spPr>
         <p:txBody>
           <a:bodyPr/>
           <a:lstStyle/>
@@ -8753,12 +8763,42 @@
             <p:ph idx="1"/>
           </p:nvPr>
         </p:nvSpPr>
-        <p:spPr/>
+        <p:spPr>
+          <a:xfrm>
+            <a:off x="0" y="1253331"/>
+            <a:ext cx="10515600" cy="4351338"/>
+          </a:xfrm>
+        </p:spPr>
         <p:txBody>
           <a:bodyPr/>
           <a:lstStyle/>
           <a:p>
-            <a:endParaRPr lang="en-US"/>
+            <a:r>
+              <a:rPr lang="en-US" dirty="0"/>
+              <a:t>Was looking for differences b/t multiplicative and chimeric model, but it’s arguable that multiplicative model isn’t even correct for these data</a:t>
+            </a:r>
+          </a:p>
+          <a:p>
+            <a:pPr lvl="1"/>
+            <a:r>
+              <a:rPr lang="en-US" dirty="0"/>
+              <a:t>Lozano-</a:t>
+            </a:r>
+            <a:r>
+              <a:rPr lang="en-US" dirty="0" err="1"/>
+              <a:t>Huntelman</a:t>
+            </a:r>
+            <a:r>
+              <a:rPr lang="en-US" dirty="0"/>
+              <a:t> et al use chimeric model, refer to “deviation from additivity”, but in supplement say this is just for consistency with literature and saying deviation from independence more appropriate</a:t>
+            </a:r>
+          </a:p>
+          <a:p>
+            <a:pPr lvl="1"/>
+            <a:r>
+              <a:rPr lang="en-US" dirty="0"/>
+              <a:t>However, “Bliss Additivity” is a distinct concept in literature, and some argue that it’s more appropriate when growth rates are used to quantify fitness differences (as opposed to population size)</a:t>
+            </a:r>
           </a:p>
         </p:txBody>
       </p:sp>
@@ -8766,6 +8806,1029 @@
     <p:extLst>
       <p:ext uri="{BB962C8B-B14F-4D97-AF65-F5344CB8AC3E}">
         <p14:creationId xmlns:p14="http://schemas.microsoft.com/office/powerpoint/2010/main" val="4170676783"/>
+      </p:ext>
+    </p:extLst>
+  </p:cSld>
+  <p:clrMapOvr>
+    <a:masterClrMapping/>
+  </p:clrMapOvr>
+</p:sld>
+</file>
+
+<file path=ppt/slides/slide16.xml><?xml version="1.0" encoding="utf-8"?>
+<p:sld xmlns:a="http://schemas.openxmlformats.org/drawingml/2006/main" xmlns:r="http://schemas.openxmlformats.org/officeDocument/2006/relationships" xmlns:p="http://schemas.openxmlformats.org/presentationml/2006/main">
+  <p:cSld>
+    <p:spTree>
+      <p:nvGrpSpPr>
+        <p:cNvPr id="1" name=""/>
+        <p:cNvGrpSpPr/>
+        <p:nvPr/>
+      </p:nvGrpSpPr>
+      <p:grpSpPr>
+        <a:xfrm>
+          <a:off x="0" y="0"/>
+          <a:ext cx="0" cy="0"/>
+          <a:chOff x="0" y="0"/>
+          <a:chExt cx="0" cy="0"/>
+        </a:xfrm>
+      </p:grpSpPr>
+      <p:pic>
+        <p:nvPicPr>
+          <p:cNvPr id="4" name="Picture 3">
+            <a:extLst>
+              <a:ext uri="{FF2B5EF4-FFF2-40B4-BE49-F238E27FC236}">
+                <a16:creationId xmlns:a16="http://schemas.microsoft.com/office/drawing/2014/main" id="{46C7B8A2-CC5A-4B32-8B39-8F6E652C9924}"/>
+              </a:ext>
+            </a:extLst>
+          </p:cNvPr>
+          <p:cNvPicPr>
+            <a:picLocks noChangeAspect="1"/>
+          </p:cNvPicPr>
+          <p:nvPr/>
+        </p:nvPicPr>
+        <p:blipFill>
+          <a:blip r:embed="rId2"/>
+          <a:stretch>
+            <a:fillRect/>
+          </a:stretch>
+        </p:blipFill>
+        <p:spPr>
+          <a:xfrm>
+            <a:off x="6289040" y="56477"/>
+            <a:ext cx="4979105" cy="6801523"/>
+          </a:xfrm>
+          <a:prstGeom prst="rect">
+            <a:avLst/>
+          </a:prstGeom>
+        </p:spPr>
+      </p:pic>
+      <p:pic>
+        <p:nvPicPr>
+          <p:cNvPr id="5" name="Picture 4">
+            <a:extLst>
+              <a:ext uri="{FF2B5EF4-FFF2-40B4-BE49-F238E27FC236}">
+                <a16:creationId xmlns:a16="http://schemas.microsoft.com/office/drawing/2014/main" id="{593FF406-448D-DE60-ABBB-6E0FFBA4D7B4}"/>
+              </a:ext>
+            </a:extLst>
+          </p:cNvPr>
+          <p:cNvPicPr>
+            <a:picLocks noChangeAspect="1"/>
+          </p:cNvPicPr>
+          <p:nvPr/>
+        </p:nvPicPr>
+        <p:blipFill>
+          <a:blip r:embed="rId3"/>
+          <a:stretch>
+            <a:fillRect/>
+          </a:stretch>
+        </p:blipFill>
+        <p:spPr>
+          <a:xfrm>
+            <a:off x="527027" y="0"/>
+            <a:ext cx="5001306" cy="6858000"/>
+          </a:xfrm>
+          <a:prstGeom prst="rect">
+            <a:avLst/>
+          </a:prstGeom>
+        </p:spPr>
+      </p:pic>
+    </p:spTree>
+    <p:extLst>
+      <p:ext uri="{BB962C8B-B14F-4D97-AF65-F5344CB8AC3E}">
+        <p14:creationId xmlns:p14="http://schemas.microsoft.com/office/powerpoint/2010/main" val="2782760678"/>
+      </p:ext>
+    </p:extLst>
+  </p:cSld>
+  <p:clrMapOvr>
+    <a:masterClrMapping/>
+  </p:clrMapOvr>
+</p:sld>
+</file>
+
+<file path=ppt/slides/slide17.xml><?xml version="1.0" encoding="utf-8"?>
+<p:sld xmlns:a="http://schemas.openxmlformats.org/drawingml/2006/main" xmlns:r="http://schemas.openxmlformats.org/officeDocument/2006/relationships" xmlns:p="http://schemas.openxmlformats.org/presentationml/2006/main">
+  <p:cSld>
+    <p:spTree>
+      <p:nvGrpSpPr>
+        <p:cNvPr id="1" name=""/>
+        <p:cNvGrpSpPr/>
+        <p:nvPr/>
+      </p:nvGrpSpPr>
+      <p:grpSpPr>
+        <a:xfrm>
+          <a:off x="0" y="0"/>
+          <a:ext cx="0" cy="0"/>
+          <a:chOff x="0" y="0"/>
+          <a:chExt cx="0" cy="0"/>
+        </a:xfrm>
+      </p:grpSpPr>
+      <p:sp>
+        <p:nvSpPr>
+          <p:cNvPr id="6" name="TextBox 5">
+            <a:extLst>
+              <a:ext uri="{FF2B5EF4-FFF2-40B4-BE49-F238E27FC236}">
+                <a16:creationId xmlns:a16="http://schemas.microsoft.com/office/drawing/2014/main" id="{CD6B6A90-21C0-FFC3-342F-523216CE24F3}"/>
+              </a:ext>
+            </a:extLst>
+          </p:cNvPr>
+          <p:cNvSpPr txBox="1"/>
+          <p:nvPr/>
+        </p:nvSpPr>
+        <p:spPr>
+          <a:xfrm>
+            <a:off x="1686560" y="2631440"/>
+            <a:ext cx="2587503" cy="369332"/>
+          </a:xfrm>
+          <a:prstGeom prst="rect">
+            <a:avLst/>
+          </a:prstGeom>
+          <a:noFill/>
+        </p:spPr>
+        <p:txBody>
+          <a:bodyPr wrap="none" rtlCol="0">
+            <a:spAutoFit/>
+          </a:bodyPr>
+          <a:lstStyle/>
+          <a:p>
+            <a:r>
+              <a:rPr lang="en-US" dirty="0"/>
+              <a:t>multiplicative v. cumulant</a:t>
+            </a:r>
+          </a:p>
+        </p:txBody>
+      </p:sp>
+      <p:sp>
+        <p:nvSpPr>
+          <p:cNvPr id="7" name="TextBox 6">
+            <a:extLst>
+              <a:ext uri="{FF2B5EF4-FFF2-40B4-BE49-F238E27FC236}">
+                <a16:creationId xmlns:a16="http://schemas.microsoft.com/office/drawing/2014/main" id="{22CAA17D-74C0-9598-0ABF-7F37231FFBB1}"/>
+              </a:ext>
+            </a:extLst>
+          </p:cNvPr>
+          <p:cNvSpPr txBox="1"/>
+          <p:nvPr/>
+        </p:nvSpPr>
+        <p:spPr>
+          <a:xfrm>
+            <a:off x="8523107" y="2631440"/>
+            <a:ext cx="2073773" cy="369332"/>
+          </a:xfrm>
+          <a:prstGeom prst="rect">
+            <a:avLst/>
+          </a:prstGeom>
+          <a:noFill/>
+        </p:spPr>
+        <p:txBody>
+          <a:bodyPr wrap="none" rtlCol="0">
+            <a:spAutoFit/>
+          </a:bodyPr>
+          <a:lstStyle/>
+          <a:p>
+            <a:r>
+              <a:rPr lang="en-US" dirty="0"/>
+              <a:t>additive v. cumulant</a:t>
+            </a:r>
+          </a:p>
+        </p:txBody>
+      </p:sp>
+      <p:sp>
+        <p:nvSpPr>
+          <p:cNvPr id="8" name="TextBox 7">
+            <a:extLst>
+              <a:ext uri="{FF2B5EF4-FFF2-40B4-BE49-F238E27FC236}">
+                <a16:creationId xmlns:a16="http://schemas.microsoft.com/office/drawing/2014/main" id="{2EEBB902-FA60-0817-0518-B31DF5F1F4B4}"/>
+              </a:ext>
+            </a:extLst>
+          </p:cNvPr>
+          <p:cNvSpPr txBox="1"/>
+          <p:nvPr/>
+        </p:nvSpPr>
+        <p:spPr>
+          <a:xfrm>
+            <a:off x="4547691" y="1227748"/>
+            <a:ext cx="2134752" cy="646331"/>
+          </a:xfrm>
+          <a:prstGeom prst="rect">
+            <a:avLst/>
+          </a:prstGeom>
+          <a:noFill/>
+        </p:spPr>
+        <p:txBody>
+          <a:bodyPr wrap="none" rtlCol="0">
+            <a:spAutoFit/>
+          </a:bodyPr>
+          <a:lstStyle/>
+          <a:p>
+            <a:r>
+              <a:rPr lang="en-US"/>
+              <a:t>solid line: spearman</a:t>
+            </a:r>
+          </a:p>
+          <a:p>
+            <a:r>
+              <a:rPr lang="en-US" dirty="0"/>
+              <a:t>dashed line: </a:t>
+            </a:r>
+            <a:r>
+              <a:rPr lang="en-US" dirty="0" err="1"/>
+              <a:t>pearson</a:t>
+            </a:r>
+            <a:endParaRPr lang="en-US" dirty="0"/>
+          </a:p>
+        </p:txBody>
+      </p:sp>
+      <p:sp>
+        <p:nvSpPr>
+          <p:cNvPr id="9" name="Title 1">
+            <a:extLst>
+              <a:ext uri="{FF2B5EF4-FFF2-40B4-BE49-F238E27FC236}">
+                <a16:creationId xmlns:a16="http://schemas.microsoft.com/office/drawing/2014/main" id="{8CEFFFD0-776D-9257-9306-05A040C96006}"/>
+              </a:ext>
+            </a:extLst>
+          </p:cNvPr>
+          <p:cNvSpPr>
+            <a:spLocks noGrp="1"/>
+          </p:cNvSpPr>
+          <p:nvPr>
+            <p:ph type="title"/>
+          </p:nvPr>
+        </p:nvSpPr>
+        <p:spPr>
+          <a:xfrm>
+            <a:off x="0" y="18255"/>
+            <a:ext cx="10515600" cy="840161"/>
+          </a:xfrm>
+        </p:spPr>
+        <p:txBody>
+          <a:bodyPr/>
+          <a:lstStyle/>
+          <a:p>
+            <a:r>
+              <a:rPr lang="en-US" dirty="0"/>
+              <a:t>cumulant more similar to additive model</a:t>
+            </a:r>
+          </a:p>
+        </p:txBody>
+      </p:sp>
+      <p:pic>
+        <p:nvPicPr>
+          <p:cNvPr id="10" name="Picture 9">
+            <a:extLst>
+              <a:ext uri="{FF2B5EF4-FFF2-40B4-BE49-F238E27FC236}">
+                <a16:creationId xmlns:a16="http://schemas.microsoft.com/office/drawing/2014/main" id="{3D38EF53-3F40-E816-A972-720D0ADF9A0A}"/>
+              </a:ext>
+            </a:extLst>
+          </p:cNvPr>
+          <p:cNvPicPr>
+            <a:picLocks noChangeAspect="1"/>
+          </p:cNvPicPr>
+          <p:nvPr/>
+        </p:nvPicPr>
+        <p:blipFill>
+          <a:blip r:embed="rId2"/>
+          <a:stretch>
+            <a:fillRect/>
+          </a:stretch>
+        </p:blipFill>
+        <p:spPr>
+          <a:xfrm>
+            <a:off x="7117999" y="3000772"/>
+            <a:ext cx="4229451" cy="2980556"/>
+          </a:xfrm>
+          <a:prstGeom prst="rect">
+            <a:avLst/>
+          </a:prstGeom>
+        </p:spPr>
+      </p:pic>
+      <p:pic>
+        <p:nvPicPr>
+          <p:cNvPr id="11" name="Picture 10">
+            <a:extLst>
+              <a:ext uri="{FF2B5EF4-FFF2-40B4-BE49-F238E27FC236}">
+                <a16:creationId xmlns:a16="http://schemas.microsoft.com/office/drawing/2014/main" id="{EF587371-11B5-88FE-B282-C97D8E432D58}"/>
+              </a:ext>
+            </a:extLst>
+          </p:cNvPr>
+          <p:cNvPicPr>
+            <a:picLocks noChangeAspect="1"/>
+          </p:cNvPicPr>
+          <p:nvPr/>
+        </p:nvPicPr>
+        <p:blipFill>
+          <a:blip r:embed="rId3"/>
+          <a:stretch>
+            <a:fillRect/>
+          </a:stretch>
+        </p:blipFill>
+        <p:spPr>
+          <a:xfrm>
+            <a:off x="844550" y="3000772"/>
+            <a:ext cx="4229452" cy="2980556"/>
+          </a:xfrm>
+          <a:prstGeom prst="rect">
+            <a:avLst/>
+          </a:prstGeom>
+        </p:spPr>
+      </p:pic>
+    </p:spTree>
+    <p:extLst>
+      <p:ext uri="{BB962C8B-B14F-4D97-AF65-F5344CB8AC3E}">
+        <p14:creationId xmlns:p14="http://schemas.microsoft.com/office/powerpoint/2010/main" val="778739767"/>
+      </p:ext>
+    </p:extLst>
+  </p:cSld>
+  <p:clrMapOvr>
+    <a:masterClrMapping/>
+  </p:clrMapOvr>
+</p:sld>
+</file>
+
+<file path=ppt/slides/slide18.xml><?xml version="1.0" encoding="utf-8"?>
+<p:sld xmlns:a="http://schemas.openxmlformats.org/drawingml/2006/main" xmlns:r="http://schemas.openxmlformats.org/officeDocument/2006/relationships" xmlns:p="http://schemas.openxmlformats.org/presentationml/2006/main">
+  <p:cSld>
+    <p:spTree>
+      <p:nvGrpSpPr>
+        <p:cNvPr id="1" name=""/>
+        <p:cNvGrpSpPr/>
+        <p:nvPr/>
+      </p:nvGrpSpPr>
+      <p:grpSpPr>
+        <a:xfrm>
+          <a:off x="0" y="0"/>
+          <a:ext cx="0" cy="0"/>
+          <a:chOff x="0" y="0"/>
+          <a:chExt cx="0" cy="0"/>
+        </a:xfrm>
+      </p:grpSpPr>
+      <p:sp>
+        <p:nvSpPr>
+          <p:cNvPr id="2" name="Title 1">
+            <a:extLst>
+              <a:ext uri="{FF2B5EF4-FFF2-40B4-BE49-F238E27FC236}">
+                <a16:creationId xmlns:a16="http://schemas.microsoft.com/office/drawing/2014/main" id="{AA0DD308-F251-F1AC-D81E-F1BD6FC03AD2}"/>
+              </a:ext>
+            </a:extLst>
+          </p:cNvPr>
+          <p:cNvSpPr>
+            <a:spLocks noGrp="1"/>
+          </p:cNvSpPr>
+          <p:nvPr>
+            <p:ph type="title"/>
+          </p:nvPr>
+        </p:nvSpPr>
+        <p:spPr>
+          <a:xfrm>
+            <a:off x="0" y="0"/>
+            <a:ext cx="10515600" cy="1325563"/>
+          </a:xfrm>
+        </p:spPr>
+        <p:txBody>
+          <a:bodyPr/>
+          <a:lstStyle/>
+          <a:p>
+            <a:r>
+              <a:rPr lang="en-US" dirty="0"/>
+              <a:t>analyses with interactions</a:t>
+            </a:r>
+          </a:p>
+        </p:txBody>
+      </p:sp>
+      <p:sp>
+        <p:nvSpPr>
+          <p:cNvPr id="3" name="Content Placeholder 2">
+            <a:extLst>
+              <a:ext uri="{FF2B5EF4-FFF2-40B4-BE49-F238E27FC236}">
+                <a16:creationId xmlns:a16="http://schemas.microsoft.com/office/drawing/2014/main" id="{959B54BD-1831-A1DC-8A72-66AF4188658F}"/>
+              </a:ext>
+            </a:extLst>
+          </p:cNvPr>
+          <p:cNvSpPr>
+            <a:spLocks noGrp="1"/>
+          </p:cNvSpPr>
+          <p:nvPr>
+            <p:ph idx="1"/>
+          </p:nvPr>
+        </p:nvSpPr>
+        <p:spPr>
+          <a:xfrm>
+            <a:off x="69919" y="1661318"/>
+            <a:ext cx="8193505" cy="4351338"/>
+          </a:xfrm>
+        </p:spPr>
+        <p:txBody>
+          <a:bodyPr/>
+          <a:lstStyle/>
+          <a:p>
+            <a:r>
+              <a:rPr lang="en-US" dirty="0"/>
+              <a:t>Yeh et al 2009, </a:t>
+            </a:r>
+            <a:r>
+              <a:rPr lang="en-US" dirty="0" err="1"/>
+              <a:t>NatRevMicro</a:t>
+            </a:r>
+            <a:endParaRPr lang="en-US" dirty="0"/>
+          </a:p>
+          <a:p>
+            <a:pPr lvl="1"/>
+            <a:r>
+              <a:rPr lang="en-US" dirty="0"/>
+              <a:t>extended ideas from epistasis to drug interactions</a:t>
+            </a:r>
+          </a:p>
+          <a:p>
+            <a:pPr lvl="2"/>
+            <a:r>
+              <a:rPr lang="en-US" dirty="0"/>
+              <a:t>drug interactions can classify drugs by function they inhibit</a:t>
+            </a:r>
+          </a:p>
+          <a:p>
+            <a:pPr lvl="2"/>
+            <a:r>
+              <a:rPr lang="en-US" dirty="0"/>
+              <a:t>expect neg. interaction if 2 redundant pathways perturbed, pos. interaction if 2 nonredundant pathways perturbed</a:t>
+            </a:r>
+          </a:p>
+          <a:p>
+            <a:pPr lvl="2"/>
+            <a:endParaRPr lang="en-US" dirty="0"/>
+          </a:p>
+          <a:p>
+            <a:r>
+              <a:rPr lang="en-US" dirty="0"/>
+              <a:t>mechanism of action interaction</a:t>
+            </a:r>
+          </a:p>
+          <a:p>
+            <a:pPr lvl="1"/>
+            <a:r>
+              <a:rPr lang="en-US" dirty="0"/>
+              <a:t>drugs may </a:t>
+            </a:r>
+            <a:r>
+              <a:rPr lang="en-US" i="1" dirty="0"/>
+              <a:t>slow </a:t>
+            </a:r>
+            <a:r>
+              <a:rPr lang="en-US" dirty="0"/>
+              <a:t>growth or </a:t>
+            </a:r>
+            <a:r>
+              <a:rPr lang="en-US" i="1" dirty="0"/>
+              <a:t>kill</a:t>
+            </a:r>
+            <a:r>
+              <a:rPr lang="en-US" dirty="0"/>
+              <a:t> cells</a:t>
+            </a:r>
+          </a:p>
+          <a:p>
+            <a:pPr lvl="1"/>
+            <a:r>
+              <a:rPr lang="en-US" dirty="0"/>
+              <a:t>antagonism b/t mechanisms b/c killing more efficient in actively dividing cells</a:t>
+            </a:r>
+          </a:p>
+          <a:p>
+            <a:pPr lvl="2"/>
+            <a:endParaRPr lang="en-US" dirty="0"/>
+          </a:p>
+          <a:p>
+            <a:endParaRPr lang="en-US" dirty="0"/>
+          </a:p>
+          <a:p>
+            <a:pPr lvl="2"/>
+            <a:endParaRPr lang="en-US" dirty="0"/>
+          </a:p>
+        </p:txBody>
+      </p:sp>
+      <p:pic>
+        <p:nvPicPr>
+          <p:cNvPr id="5" name="Picture 4">
+            <a:extLst>
+              <a:ext uri="{FF2B5EF4-FFF2-40B4-BE49-F238E27FC236}">
+                <a16:creationId xmlns:a16="http://schemas.microsoft.com/office/drawing/2014/main" id="{C8780A3C-992D-1843-A5A8-82CF889DD536}"/>
+              </a:ext>
+            </a:extLst>
+          </p:cNvPr>
+          <p:cNvPicPr>
+            <a:picLocks noChangeAspect="1"/>
+          </p:cNvPicPr>
+          <p:nvPr/>
+        </p:nvPicPr>
+        <p:blipFill rotWithShape="1">
+          <a:blip r:embed="rId2"/>
+          <a:srcRect l="4563" r="10983"/>
+          <a:stretch/>
+        </p:blipFill>
+        <p:spPr>
+          <a:xfrm>
+            <a:off x="8596562" y="152400"/>
+            <a:ext cx="3595438" cy="3986463"/>
+          </a:xfrm>
+          <a:prstGeom prst="rect">
+            <a:avLst/>
+          </a:prstGeom>
+        </p:spPr>
+      </p:pic>
+      <p:pic>
+        <p:nvPicPr>
+          <p:cNvPr id="7" name="Picture 6">
+            <a:extLst>
+              <a:ext uri="{FF2B5EF4-FFF2-40B4-BE49-F238E27FC236}">
+                <a16:creationId xmlns:a16="http://schemas.microsoft.com/office/drawing/2014/main" id="{FEA06D89-09B8-3035-14A6-E65971DEC3ED}"/>
+              </a:ext>
+            </a:extLst>
+          </p:cNvPr>
+          <p:cNvPicPr>
+            <a:picLocks noChangeAspect="1"/>
+          </p:cNvPicPr>
+          <p:nvPr/>
+        </p:nvPicPr>
+        <p:blipFill>
+          <a:blip r:embed="rId3"/>
+          <a:stretch>
+            <a:fillRect/>
+          </a:stretch>
+        </p:blipFill>
+        <p:spPr>
+          <a:xfrm>
+            <a:off x="6995008" y="5167312"/>
+            <a:ext cx="5196992" cy="1690688"/>
+          </a:xfrm>
+          <a:prstGeom prst="rect">
+            <a:avLst/>
+          </a:prstGeom>
+        </p:spPr>
+      </p:pic>
+    </p:spTree>
+    <p:extLst>
+      <p:ext uri="{BB962C8B-B14F-4D97-AF65-F5344CB8AC3E}">
+        <p14:creationId xmlns:p14="http://schemas.microsoft.com/office/powerpoint/2010/main" val="591793365"/>
+      </p:ext>
+    </p:extLst>
+  </p:cSld>
+  <p:clrMapOvr>
+    <a:masterClrMapping/>
+  </p:clrMapOvr>
+</p:sld>
+</file>
+
+<file path=ppt/slides/slide19.xml><?xml version="1.0" encoding="utf-8"?>
+<p:sld xmlns:a="http://schemas.openxmlformats.org/drawingml/2006/main" xmlns:r="http://schemas.openxmlformats.org/officeDocument/2006/relationships" xmlns:p="http://schemas.openxmlformats.org/presentationml/2006/main">
+  <p:cSld>
+    <p:spTree>
+      <p:nvGrpSpPr>
+        <p:cNvPr id="1" name=""/>
+        <p:cNvGrpSpPr/>
+        <p:nvPr/>
+      </p:nvGrpSpPr>
+      <p:grpSpPr>
+        <a:xfrm>
+          <a:off x="0" y="0"/>
+          <a:ext cx="0" cy="0"/>
+          <a:chOff x="0" y="0"/>
+          <a:chExt cx="0" cy="0"/>
+        </a:xfrm>
+      </p:grpSpPr>
+      <p:pic>
+        <p:nvPicPr>
+          <p:cNvPr id="5" name="Picture 4">
+            <a:extLst>
+              <a:ext uri="{FF2B5EF4-FFF2-40B4-BE49-F238E27FC236}">
+                <a16:creationId xmlns:a16="http://schemas.microsoft.com/office/drawing/2014/main" id="{933C9428-328B-A58D-CB45-FC7D93C9BDA1}"/>
+              </a:ext>
+            </a:extLst>
+          </p:cNvPr>
+          <p:cNvPicPr>
+            <a:picLocks noChangeAspect="1"/>
+          </p:cNvPicPr>
+          <p:nvPr/>
+        </p:nvPicPr>
+        <p:blipFill>
+          <a:blip r:embed="rId2"/>
+          <a:stretch>
+            <a:fillRect/>
+          </a:stretch>
+        </p:blipFill>
+        <p:spPr>
+          <a:xfrm>
+            <a:off x="329179" y="1218257"/>
+            <a:ext cx="7029563" cy="5639743"/>
+          </a:xfrm>
+          <a:prstGeom prst="rect">
+            <a:avLst/>
+          </a:prstGeom>
+        </p:spPr>
+      </p:pic>
+      <p:sp>
+        <p:nvSpPr>
+          <p:cNvPr id="6" name="Title 1">
+            <a:extLst>
+              <a:ext uri="{FF2B5EF4-FFF2-40B4-BE49-F238E27FC236}">
+                <a16:creationId xmlns:a16="http://schemas.microsoft.com/office/drawing/2014/main" id="{4D10ACC7-E6C9-A64A-1C20-F4E1CD051CA1}"/>
+              </a:ext>
+            </a:extLst>
+          </p:cNvPr>
+          <p:cNvSpPr>
+            <a:spLocks noGrp="1"/>
+          </p:cNvSpPr>
+          <p:nvPr>
+            <p:ph type="title"/>
+          </p:nvPr>
+        </p:nvSpPr>
+        <p:spPr>
+          <a:xfrm>
+            <a:off x="0" y="0"/>
+            <a:ext cx="10515600" cy="1325563"/>
+          </a:xfrm>
+        </p:spPr>
+        <p:txBody>
+          <a:bodyPr/>
+          <a:lstStyle/>
+          <a:p>
+            <a:r>
+              <a:rPr lang="en-US" dirty="0"/>
+              <a:t>not many drug combos from same pathway</a:t>
+            </a:r>
+          </a:p>
+        </p:txBody>
+      </p:sp>
+      <p:sp>
+        <p:nvSpPr>
+          <p:cNvPr id="7" name="TextBox 6">
+            <a:extLst>
+              <a:ext uri="{FF2B5EF4-FFF2-40B4-BE49-F238E27FC236}">
+                <a16:creationId xmlns:a16="http://schemas.microsoft.com/office/drawing/2014/main" id="{94C717BB-6B3F-7F61-6D02-3C9427A6EF0A}"/>
+              </a:ext>
+            </a:extLst>
+          </p:cNvPr>
+          <p:cNvSpPr txBox="1"/>
+          <p:nvPr/>
+        </p:nvSpPr>
+        <p:spPr>
+          <a:xfrm>
+            <a:off x="7477760" y="1655292"/>
+            <a:ext cx="1273810" cy="369332"/>
+          </a:xfrm>
+          <a:prstGeom prst="rect">
+            <a:avLst/>
+          </a:prstGeom>
+          <a:noFill/>
+        </p:spPr>
+        <p:txBody>
+          <a:bodyPr wrap="none" rtlCol="0">
+            <a:spAutoFit/>
+          </a:bodyPr>
+          <a:lstStyle/>
+          <a:p>
+            <a:r>
+              <a:rPr lang="en-US" dirty="0">
+                <a:solidFill>
+                  <a:srgbClr val="FF0000"/>
+                </a:solidFill>
+              </a:rPr>
+              <a:t>bactericidal</a:t>
+            </a:r>
+          </a:p>
+        </p:txBody>
+      </p:sp>
+      <p:sp>
+        <p:nvSpPr>
+          <p:cNvPr id="8" name="TextBox 7">
+            <a:extLst>
+              <a:ext uri="{FF2B5EF4-FFF2-40B4-BE49-F238E27FC236}">
+                <a16:creationId xmlns:a16="http://schemas.microsoft.com/office/drawing/2014/main" id="{B73E0FFE-64CB-E418-B119-E1D576C5F01E}"/>
+              </a:ext>
+            </a:extLst>
+          </p:cNvPr>
+          <p:cNvSpPr txBox="1"/>
+          <p:nvPr/>
+        </p:nvSpPr>
+        <p:spPr>
+          <a:xfrm>
+            <a:off x="7477760" y="2344981"/>
+            <a:ext cx="1273810" cy="369332"/>
+          </a:xfrm>
+          <a:prstGeom prst="rect">
+            <a:avLst/>
+          </a:prstGeom>
+          <a:noFill/>
+        </p:spPr>
+        <p:txBody>
+          <a:bodyPr wrap="none" rtlCol="0">
+            <a:spAutoFit/>
+          </a:bodyPr>
+          <a:lstStyle/>
+          <a:p>
+            <a:r>
+              <a:rPr lang="en-US" dirty="0">
+                <a:solidFill>
+                  <a:srgbClr val="FF0000"/>
+                </a:solidFill>
+              </a:rPr>
+              <a:t>bactericidal</a:t>
+            </a:r>
+          </a:p>
+        </p:txBody>
+      </p:sp>
+      <p:sp>
+        <p:nvSpPr>
+          <p:cNvPr id="9" name="TextBox 8">
+            <a:extLst>
+              <a:ext uri="{FF2B5EF4-FFF2-40B4-BE49-F238E27FC236}">
+                <a16:creationId xmlns:a16="http://schemas.microsoft.com/office/drawing/2014/main" id="{3D24C240-DFC5-1A4C-6C05-3A125B4BB50B}"/>
+              </a:ext>
+            </a:extLst>
+          </p:cNvPr>
+          <p:cNvSpPr txBox="1"/>
+          <p:nvPr/>
+        </p:nvSpPr>
+        <p:spPr>
+          <a:xfrm>
+            <a:off x="7477760" y="3034670"/>
+            <a:ext cx="1457066" cy="369332"/>
+          </a:xfrm>
+          <a:prstGeom prst="rect">
+            <a:avLst/>
+          </a:prstGeom>
+          <a:noFill/>
+        </p:spPr>
+        <p:txBody>
+          <a:bodyPr wrap="none" rtlCol="0">
+            <a:spAutoFit/>
+          </a:bodyPr>
+          <a:lstStyle/>
+          <a:p>
+            <a:r>
+              <a:rPr lang="en-US" dirty="0">
+                <a:solidFill>
+                  <a:schemeClr val="accent2"/>
+                </a:solidFill>
+              </a:rPr>
+              <a:t>bacteriostatic</a:t>
+            </a:r>
+          </a:p>
+        </p:txBody>
+      </p:sp>
+      <p:sp>
+        <p:nvSpPr>
+          <p:cNvPr id="11" name="TextBox 10">
+            <a:extLst>
+              <a:ext uri="{FF2B5EF4-FFF2-40B4-BE49-F238E27FC236}">
+                <a16:creationId xmlns:a16="http://schemas.microsoft.com/office/drawing/2014/main" id="{154F3B66-95EF-C759-C603-DA492E840767}"/>
+              </a:ext>
+            </a:extLst>
+          </p:cNvPr>
+          <p:cNvSpPr txBox="1"/>
+          <p:nvPr/>
+        </p:nvSpPr>
+        <p:spPr>
+          <a:xfrm>
+            <a:off x="7477760" y="3678168"/>
+            <a:ext cx="1273810" cy="369332"/>
+          </a:xfrm>
+          <a:prstGeom prst="rect">
+            <a:avLst/>
+          </a:prstGeom>
+          <a:noFill/>
+        </p:spPr>
+        <p:txBody>
+          <a:bodyPr wrap="none" rtlCol="0">
+            <a:spAutoFit/>
+          </a:bodyPr>
+          <a:lstStyle/>
+          <a:p>
+            <a:r>
+              <a:rPr lang="en-US" dirty="0">
+                <a:solidFill>
+                  <a:srgbClr val="FF0000"/>
+                </a:solidFill>
+              </a:rPr>
+              <a:t>bactericidal</a:t>
+            </a:r>
+          </a:p>
+        </p:txBody>
+      </p:sp>
+      <p:sp>
+        <p:nvSpPr>
+          <p:cNvPr id="12" name="TextBox 11">
+            <a:extLst>
+              <a:ext uri="{FF2B5EF4-FFF2-40B4-BE49-F238E27FC236}">
+                <a16:creationId xmlns:a16="http://schemas.microsoft.com/office/drawing/2014/main" id="{C9B06296-C167-3327-9DE9-EF1F484BCE34}"/>
+              </a:ext>
+            </a:extLst>
+          </p:cNvPr>
+          <p:cNvSpPr txBox="1"/>
+          <p:nvPr/>
+        </p:nvSpPr>
+        <p:spPr>
+          <a:xfrm>
+            <a:off x="7477760" y="4321666"/>
+            <a:ext cx="1273810" cy="369332"/>
+          </a:xfrm>
+          <a:prstGeom prst="rect">
+            <a:avLst/>
+          </a:prstGeom>
+          <a:noFill/>
+        </p:spPr>
+        <p:txBody>
+          <a:bodyPr wrap="none" rtlCol="0">
+            <a:spAutoFit/>
+          </a:bodyPr>
+          <a:lstStyle/>
+          <a:p>
+            <a:r>
+              <a:rPr lang="en-US" dirty="0">
+                <a:solidFill>
+                  <a:srgbClr val="FF0000"/>
+                </a:solidFill>
+              </a:rPr>
+              <a:t>bactericidal</a:t>
+            </a:r>
+          </a:p>
+        </p:txBody>
+      </p:sp>
+      <p:sp>
+        <p:nvSpPr>
+          <p:cNvPr id="13" name="TextBox 12">
+            <a:extLst>
+              <a:ext uri="{FF2B5EF4-FFF2-40B4-BE49-F238E27FC236}">
+                <a16:creationId xmlns:a16="http://schemas.microsoft.com/office/drawing/2014/main" id="{A588F0FE-A068-177D-8684-0D0146F4FD40}"/>
+              </a:ext>
+            </a:extLst>
+          </p:cNvPr>
+          <p:cNvSpPr txBox="1"/>
+          <p:nvPr/>
+        </p:nvSpPr>
+        <p:spPr>
+          <a:xfrm>
+            <a:off x="7477760" y="4919071"/>
+            <a:ext cx="1457066" cy="369332"/>
+          </a:xfrm>
+          <a:prstGeom prst="rect">
+            <a:avLst/>
+          </a:prstGeom>
+          <a:noFill/>
+        </p:spPr>
+        <p:txBody>
+          <a:bodyPr wrap="none" rtlCol="0">
+            <a:spAutoFit/>
+          </a:bodyPr>
+          <a:lstStyle/>
+          <a:p>
+            <a:r>
+              <a:rPr lang="en-US" dirty="0">
+                <a:solidFill>
+                  <a:schemeClr val="accent2"/>
+                </a:solidFill>
+              </a:rPr>
+              <a:t>bacteriostatic</a:t>
+            </a:r>
+          </a:p>
+        </p:txBody>
+      </p:sp>
+      <p:sp>
+        <p:nvSpPr>
+          <p:cNvPr id="14" name="TextBox 13">
+            <a:extLst>
+              <a:ext uri="{FF2B5EF4-FFF2-40B4-BE49-F238E27FC236}">
+                <a16:creationId xmlns:a16="http://schemas.microsoft.com/office/drawing/2014/main" id="{F0D4335A-2254-D61A-D9C8-81815859C2A7}"/>
+              </a:ext>
+            </a:extLst>
+          </p:cNvPr>
+          <p:cNvSpPr txBox="1"/>
+          <p:nvPr/>
+        </p:nvSpPr>
+        <p:spPr>
+          <a:xfrm>
+            <a:off x="7477760" y="5545920"/>
+            <a:ext cx="1457066" cy="369332"/>
+          </a:xfrm>
+          <a:prstGeom prst="rect">
+            <a:avLst/>
+          </a:prstGeom>
+          <a:noFill/>
+        </p:spPr>
+        <p:txBody>
+          <a:bodyPr wrap="none" rtlCol="0">
+            <a:spAutoFit/>
+          </a:bodyPr>
+          <a:lstStyle/>
+          <a:p>
+            <a:r>
+              <a:rPr lang="en-US" dirty="0">
+                <a:solidFill>
+                  <a:schemeClr val="accent2"/>
+                </a:solidFill>
+              </a:rPr>
+              <a:t>bacteriostatic</a:t>
+            </a:r>
+          </a:p>
+        </p:txBody>
+      </p:sp>
+      <p:sp>
+        <p:nvSpPr>
+          <p:cNvPr id="15" name="TextBox 14">
+            <a:extLst>
+              <a:ext uri="{FF2B5EF4-FFF2-40B4-BE49-F238E27FC236}">
+                <a16:creationId xmlns:a16="http://schemas.microsoft.com/office/drawing/2014/main" id="{122743D2-8D36-7414-6E52-88EB6BEC6414}"/>
+              </a:ext>
+            </a:extLst>
+          </p:cNvPr>
+          <p:cNvSpPr txBox="1"/>
+          <p:nvPr/>
+        </p:nvSpPr>
+        <p:spPr>
+          <a:xfrm>
+            <a:off x="7477760" y="6158938"/>
+            <a:ext cx="1457066" cy="369332"/>
+          </a:xfrm>
+          <a:prstGeom prst="rect">
+            <a:avLst/>
+          </a:prstGeom>
+          <a:noFill/>
+        </p:spPr>
+        <p:txBody>
+          <a:bodyPr wrap="none" rtlCol="0">
+            <a:spAutoFit/>
+          </a:bodyPr>
+          <a:lstStyle/>
+          <a:p>
+            <a:r>
+              <a:rPr lang="en-US" dirty="0">
+                <a:solidFill>
+                  <a:schemeClr val="accent2"/>
+                </a:solidFill>
+              </a:rPr>
+              <a:t>bacteriostatic</a:t>
+            </a:r>
+          </a:p>
+        </p:txBody>
+      </p:sp>
+      <p:sp>
+        <p:nvSpPr>
+          <p:cNvPr id="16" name="TextBox 15">
+            <a:extLst>
+              <a:ext uri="{FF2B5EF4-FFF2-40B4-BE49-F238E27FC236}">
+                <a16:creationId xmlns:a16="http://schemas.microsoft.com/office/drawing/2014/main" id="{0CE3CD50-AA8F-538A-69B3-CDE1BD29C1F6}"/>
+              </a:ext>
+            </a:extLst>
+          </p:cNvPr>
+          <p:cNvSpPr txBox="1"/>
+          <p:nvPr/>
+        </p:nvSpPr>
+        <p:spPr>
+          <a:xfrm>
+            <a:off x="9290426" y="1898431"/>
+            <a:ext cx="2986972" cy="646331"/>
+          </a:xfrm>
+          <a:prstGeom prst="rect">
+            <a:avLst/>
+          </a:prstGeom>
+          <a:noFill/>
+        </p:spPr>
+        <p:txBody>
+          <a:bodyPr wrap="none" rtlCol="0">
+            <a:spAutoFit/>
+          </a:bodyPr>
+          <a:lstStyle/>
+          <a:p>
+            <a:r>
+              <a:rPr lang="en-US" dirty="0">
+                <a:solidFill>
+                  <a:schemeClr val="accent2"/>
+                </a:solidFill>
+              </a:rPr>
+              <a:t>bacteriostatic</a:t>
+            </a:r>
+            <a:r>
+              <a:rPr lang="en-US" dirty="0"/>
+              <a:t>: inhibits growth</a:t>
+            </a:r>
+          </a:p>
+          <a:p>
+            <a:r>
+              <a:rPr lang="en-US" dirty="0">
+                <a:solidFill>
+                  <a:srgbClr val="FF0000"/>
+                </a:solidFill>
+              </a:rPr>
+              <a:t>bactericidal</a:t>
+            </a:r>
+            <a:r>
+              <a:rPr lang="en-US" dirty="0"/>
+              <a:t>: kills cells</a:t>
+            </a:r>
+          </a:p>
+        </p:txBody>
+      </p:sp>
+    </p:spTree>
+    <p:extLst>
+      <p:ext uri="{BB962C8B-B14F-4D97-AF65-F5344CB8AC3E}">
+        <p14:creationId xmlns:p14="http://schemas.microsoft.com/office/powerpoint/2010/main" val="1191194833"/>
       </p:ext>
     </p:extLst>
   </p:cSld>
@@ -8876,6 +9939,163 @@
     <p:extLst>
       <p:ext uri="{BB962C8B-B14F-4D97-AF65-F5344CB8AC3E}">
         <p14:creationId xmlns:p14="http://schemas.microsoft.com/office/powerpoint/2010/main" val="2280412243"/>
+      </p:ext>
+    </p:extLst>
+  </p:cSld>
+  <p:clrMapOvr>
+    <a:masterClrMapping/>
+  </p:clrMapOvr>
+</p:sld>
+</file>
+
+<file path=ppt/slides/slide20.xml><?xml version="1.0" encoding="utf-8"?>
+<p:sld xmlns:a="http://schemas.openxmlformats.org/drawingml/2006/main" xmlns:r="http://schemas.openxmlformats.org/officeDocument/2006/relationships" xmlns:p="http://schemas.openxmlformats.org/presentationml/2006/main">
+  <p:cSld>
+    <p:spTree>
+      <p:nvGrpSpPr>
+        <p:cNvPr id="1" name=""/>
+        <p:cNvGrpSpPr/>
+        <p:nvPr/>
+      </p:nvGrpSpPr>
+      <p:grpSpPr>
+        <a:xfrm>
+          <a:off x="0" y="0"/>
+          <a:ext cx="0" cy="0"/>
+          <a:chOff x="0" y="0"/>
+          <a:chExt cx="0" cy="0"/>
+        </a:xfrm>
+      </p:grpSpPr>
+      <p:sp>
+        <p:nvSpPr>
+          <p:cNvPr id="2" name="Title 1">
+            <a:extLst>
+              <a:ext uri="{FF2B5EF4-FFF2-40B4-BE49-F238E27FC236}">
+                <a16:creationId xmlns:a16="http://schemas.microsoft.com/office/drawing/2014/main" id="{866EA1AA-773F-93CB-B01F-8AD6D914FF31}"/>
+              </a:ext>
+            </a:extLst>
+          </p:cNvPr>
+          <p:cNvSpPr>
+            <a:spLocks noGrp="1"/>
+          </p:cNvSpPr>
+          <p:nvPr>
+            <p:ph type="title"/>
+          </p:nvPr>
+        </p:nvSpPr>
+        <p:spPr/>
+        <p:txBody>
+          <a:bodyPr/>
+          <a:lstStyle/>
+          <a:p>
+            <a:r>
+              <a:rPr lang="en-US" dirty="0"/>
+              <a:t>analyses with interactions</a:t>
+            </a:r>
+          </a:p>
+        </p:txBody>
+      </p:sp>
+      <p:sp>
+        <p:nvSpPr>
+          <p:cNvPr id="3" name="Content Placeholder 2">
+            <a:extLst>
+              <a:ext uri="{FF2B5EF4-FFF2-40B4-BE49-F238E27FC236}">
+                <a16:creationId xmlns:a16="http://schemas.microsoft.com/office/drawing/2014/main" id="{81FD2D05-8AC4-76D8-F44E-B328A2FD396D}"/>
+              </a:ext>
+            </a:extLst>
+          </p:cNvPr>
+          <p:cNvSpPr>
+            <a:spLocks noGrp="1"/>
+          </p:cNvSpPr>
+          <p:nvPr>
+            <p:ph idx="1"/>
+          </p:nvPr>
+        </p:nvSpPr>
+        <p:spPr/>
+        <p:txBody>
+          <a:bodyPr/>
+          <a:lstStyle/>
+          <a:p>
+            <a:endParaRPr lang="en-US" dirty="0"/>
+          </a:p>
+          <a:p>
+            <a:r>
+              <a:rPr lang="en-US" dirty="0"/>
+              <a:t>what do we expect, and does additive/multiplicative model verify those expectations more than chimeric model</a:t>
+            </a:r>
+          </a:p>
+          <a:p>
+            <a:pPr lvl="1"/>
+            <a:r>
+              <a:rPr lang="en-US" dirty="0"/>
+              <a:t>higher-order interactions b/t bacteriostatic and bactericidal?</a:t>
+            </a:r>
+          </a:p>
+          <a:p>
+            <a:pPr lvl="1"/>
+            <a:endParaRPr lang="en-US" dirty="0"/>
+          </a:p>
+          <a:p>
+            <a:pPr lvl="1"/>
+            <a:endParaRPr lang="en-US" dirty="0"/>
+          </a:p>
+          <a:p>
+            <a:pPr lvl="1"/>
+            <a:endParaRPr lang="en-US" dirty="0"/>
+          </a:p>
+          <a:p>
+            <a:pPr marL="0" marR="0">
+              <a:spcBef>
+                <a:spcPts val="0"/>
+              </a:spcBef>
+              <a:spcAft>
+                <a:spcPts val="0"/>
+              </a:spcAft>
+            </a:pPr>
+            <a:r>
+              <a:rPr lang="en-US" sz="1800" dirty="0">
+                <a:effectLst/>
+                <a:latin typeface="Calibri" panose="020F0502020204030204" pitchFamily="34" charset="0"/>
+              </a:rPr>
+              <a:t>Action items</a:t>
+            </a:r>
+          </a:p>
+          <a:p>
+            <a:pPr lvl="1" fontAlgn="ctr">
+              <a:spcBef>
+                <a:spcPts val="0"/>
+              </a:spcBef>
+            </a:pPr>
+            <a:r>
+              <a:rPr lang="en-US" sz="1400" dirty="0">
+                <a:effectLst/>
+                <a:latin typeface="Calibri" panose="020F0502020204030204" pitchFamily="34" charset="0"/>
+              </a:rPr>
+              <a:t>show  protein synthesis inhibitors have antagonistic higher-order interactions? Since inhibiting one ribosomal subunit enough to diminish function? e.g. the two 50S drugs with one of the 30S drugs</a:t>
+            </a:r>
+          </a:p>
+          <a:p>
+            <a:pPr lvl="1" fontAlgn="ctr">
+              <a:spcBef>
+                <a:spcPts val="0"/>
+              </a:spcBef>
+            </a:pPr>
+            <a:r>
+              <a:rPr lang="en-US" sz="1400" dirty="0">
+                <a:effectLst/>
+                <a:latin typeface="Calibri" panose="020F0502020204030204" pitchFamily="34" charset="0"/>
+              </a:rPr>
+              <a:t>show higher-order antagonism b/t bactericidal and bacteriostatic</a:t>
+            </a:r>
+          </a:p>
+          <a:p>
+            <a:pPr lvl="1"/>
+            <a:endParaRPr lang="en-US" dirty="0"/>
+          </a:p>
+        </p:txBody>
+      </p:sp>
+    </p:spTree>
+    <p:extLst>
+      <p:ext uri="{BB962C8B-B14F-4D97-AF65-F5344CB8AC3E}">
+        <p14:creationId xmlns:p14="http://schemas.microsoft.com/office/powerpoint/2010/main" val="3107497647"/>
       </p:ext>
     </p:extLst>
   </p:cSld>

</xml_diff>

<commit_message>
freeze after notebook bug deleted cells for Kuzmin analysis
</commit_message>
<xml_diff>
--- a/drug_data/drug_data_reanalysis.pptx
+++ b/drug_data/drug_data_reanalysis.pptx
@@ -5,7 +5,7 @@
     <p:sldMasterId id="2147483648" r:id="rId1"/>
   </p:sldMasterIdLst>
   <p:notesMasterIdLst>
-    <p:notesMasterId r:id="rId29"/>
+    <p:notesMasterId r:id="rId30"/>
   </p:notesMasterIdLst>
   <p:sldIdLst>
     <p:sldId id="256" r:id="rId2"/>
@@ -35,6 +35,7 @@
     <p:sldId id="282" r:id="rId26"/>
     <p:sldId id="278" r:id="rId27"/>
     <p:sldId id="274" r:id="rId28"/>
+    <p:sldId id="285" r:id="rId29"/>
   </p:sldIdLst>
   <p:sldSz cx="12192000" cy="6858000"/>
   <p:notesSz cx="6858000" cy="9144000"/>
@@ -234,7 +235,7 @@
           <a:p>
             <a:fld id="{56041344-4514-DF47-854A-62330FF8B009}" type="datetimeFigureOut">
               <a:rPr lang="en-US" smtClean="0"/>
-              <a:t>11/9/22</a:t>
+              <a:t>11/29/22</a:t>
             </a:fld>
             <a:endParaRPr lang="en-US"/>
           </a:p>
@@ -909,7 +910,7 @@
           <a:p>
             <a:fld id="{969DC319-9076-C343-B595-206709831AE2}" type="datetimeFigureOut">
               <a:rPr lang="en-US" smtClean="0"/>
-              <a:t>11/9/22</a:t>
+              <a:t>11/29/22</a:t>
             </a:fld>
             <a:endParaRPr lang="en-US"/>
           </a:p>
@@ -1107,7 +1108,7 @@
           <a:p>
             <a:fld id="{969DC319-9076-C343-B595-206709831AE2}" type="datetimeFigureOut">
               <a:rPr lang="en-US" smtClean="0"/>
-              <a:t>11/9/22</a:t>
+              <a:t>11/29/22</a:t>
             </a:fld>
             <a:endParaRPr lang="en-US"/>
           </a:p>
@@ -1315,7 +1316,7 @@
           <a:p>
             <a:fld id="{969DC319-9076-C343-B595-206709831AE2}" type="datetimeFigureOut">
               <a:rPr lang="en-US" smtClean="0"/>
-              <a:t>11/9/22</a:t>
+              <a:t>11/29/22</a:t>
             </a:fld>
             <a:endParaRPr lang="en-US"/>
           </a:p>
@@ -1513,7 +1514,7 @@
           <a:p>
             <a:fld id="{969DC319-9076-C343-B595-206709831AE2}" type="datetimeFigureOut">
               <a:rPr lang="en-US" smtClean="0"/>
-              <a:t>11/9/22</a:t>
+              <a:t>11/29/22</a:t>
             </a:fld>
             <a:endParaRPr lang="en-US"/>
           </a:p>
@@ -1788,7 +1789,7 @@
           <a:p>
             <a:fld id="{969DC319-9076-C343-B595-206709831AE2}" type="datetimeFigureOut">
               <a:rPr lang="en-US" smtClean="0"/>
-              <a:t>11/9/22</a:t>
+              <a:t>11/29/22</a:t>
             </a:fld>
             <a:endParaRPr lang="en-US"/>
           </a:p>
@@ -2053,7 +2054,7 @@
           <a:p>
             <a:fld id="{969DC319-9076-C343-B595-206709831AE2}" type="datetimeFigureOut">
               <a:rPr lang="en-US" smtClean="0"/>
-              <a:t>11/9/22</a:t>
+              <a:t>11/29/22</a:t>
             </a:fld>
             <a:endParaRPr lang="en-US"/>
           </a:p>
@@ -2465,7 +2466,7 @@
           <a:p>
             <a:fld id="{969DC319-9076-C343-B595-206709831AE2}" type="datetimeFigureOut">
               <a:rPr lang="en-US" smtClean="0"/>
-              <a:t>11/9/22</a:t>
+              <a:t>11/29/22</a:t>
             </a:fld>
             <a:endParaRPr lang="en-US"/>
           </a:p>
@@ -2606,7 +2607,7 @@
           <a:p>
             <a:fld id="{969DC319-9076-C343-B595-206709831AE2}" type="datetimeFigureOut">
               <a:rPr lang="en-US" smtClean="0"/>
-              <a:t>11/9/22</a:t>
+              <a:t>11/29/22</a:t>
             </a:fld>
             <a:endParaRPr lang="en-US"/>
           </a:p>
@@ -2719,7 +2720,7 @@
           <a:p>
             <a:fld id="{969DC319-9076-C343-B595-206709831AE2}" type="datetimeFigureOut">
               <a:rPr lang="en-US" smtClean="0"/>
-              <a:t>11/9/22</a:t>
+              <a:t>11/29/22</a:t>
             </a:fld>
             <a:endParaRPr lang="en-US"/>
           </a:p>
@@ -3030,7 +3031,7 @@
           <a:p>
             <a:fld id="{969DC319-9076-C343-B595-206709831AE2}" type="datetimeFigureOut">
               <a:rPr lang="en-US" smtClean="0"/>
-              <a:t>11/9/22</a:t>
+              <a:t>11/29/22</a:t>
             </a:fld>
             <a:endParaRPr lang="en-US"/>
           </a:p>
@@ -3318,7 +3319,7 @@
           <a:p>
             <a:fld id="{969DC319-9076-C343-B595-206709831AE2}" type="datetimeFigureOut">
               <a:rPr lang="en-US" smtClean="0"/>
-              <a:t>11/9/22</a:t>
+              <a:t>11/29/22</a:t>
             </a:fld>
             <a:endParaRPr lang="en-US"/>
           </a:p>
@@ -3559,7 +3560,7 @@
           <a:p>
             <a:fld id="{969DC319-9076-C343-B595-206709831AE2}" type="datetimeFigureOut">
               <a:rPr lang="en-US" smtClean="0"/>
-              <a:t>11/9/22</a:t>
+              <a:t>11/29/22</a:t>
             </a:fld>
             <a:endParaRPr lang="en-US"/>
           </a:p>
@@ -10206,10 +10207,10 @@
       </p:sp>
       <p:pic>
         <p:nvPicPr>
-          <p:cNvPr id="4" name="Picture 3">
-            <a:extLst>
-              <a:ext uri="{FF2B5EF4-FFF2-40B4-BE49-F238E27FC236}">
-                <a16:creationId xmlns:a16="http://schemas.microsoft.com/office/drawing/2014/main" id="{7C230837-EED0-AFC0-2A4A-E844A8EE8F57}"/>
+          <p:cNvPr id="5" name="Picture 4">
+            <a:extLst>
+              <a:ext uri="{FF2B5EF4-FFF2-40B4-BE49-F238E27FC236}">
+                <a16:creationId xmlns:a16="http://schemas.microsoft.com/office/drawing/2014/main" id="{6FADD6B4-23DF-1A68-928E-E034EBCE0F36}"/>
               </a:ext>
             </a:extLst>
           </p:cNvPr>
@@ -10226,38 +10227,8 @@
         </p:blipFill>
         <p:spPr>
           <a:xfrm>
-            <a:off x="340106" y="2804160"/>
-            <a:ext cx="5108501" cy="3438652"/>
-          </a:xfrm>
-          <a:prstGeom prst="rect">
-            <a:avLst/>
-          </a:prstGeom>
-        </p:spPr>
-      </p:pic>
-      <p:pic>
-        <p:nvPicPr>
-          <p:cNvPr id="12" name="Picture 11">
-            <a:extLst>
-              <a:ext uri="{FF2B5EF4-FFF2-40B4-BE49-F238E27FC236}">
-                <a16:creationId xmlns:a16="http://schemas.microsoft.com/office/drawing/2014/main" id="{7EFDD8D3-5367-49E2-C6CD-7978C680C993}"/>
-              </a:ext>
-            </a:extLst>
-          </p:cNvPr>
-          <p:cNvPicPr>
-            <a:picLocks noChangeAspect="1"/>
-          </p:cNvPicPr>
-          <p:nvPr/>
-        </p:nvPicPr>
-        <p:blipFill>
-          <a:blip r:embed="rId3"/>
-          <a:stretch>
-            <a:fillRect/>
-          </a:stretch>
-        </p:blipFill>
-        <p:spPr>
-          <a:xfrm>
-            <a:off x="6225794" y="2804160"/>
-            <a:ext cx="5626100" cy="3530600"/>
+            <a:off x="425450" y="3035808"/>
+            <a:ext cx="5245100" cy="3530600"/>
           </a:xfrm>
           <a:prstGeom prst="rect">
             <a:avLst/>
@@ -10383,10 +10354,10 @@
       </p:sp>
       <p:pic>
         <p:nvPicPr>
-          <p:cNvPr id="6" name="Picture 5">
-            <a:extLst>
-              <a:ext uri="{FF2B5EF4-FFF2-40B4-BE49-F238E27FC236}">
-                <a16:creationId xmlns:a16="http://schemas.microsoft.com/office/drawing/2014/main" id="{A0365240-2472-EDF3-06A6-264FAC8010F8}"/>
+          <p:cNvPr id="4" name="Picture 3">
+            <a:extLst>
+              <a:ext uri="{FF2B5EF4-FFF2-40B4-BE49-F238E27FC236}">
+                <a16:creationId xmlns:a16="http://schemas.microsoft.com/office/drawing/2014/main" id="{B0642708-74A2-C87B-7661-41BFB7DB71DA}"/>
               </a:ext>
             </a:extLst>
           </p:cNvPr>
@@ -10403,38 +10374,8 @@
         </p:blipFill>
         <p:spPr>
           <a:xfrm>
-            <a:off x="413258" y="2968244"/>
+            <a:off x="669290" y="2992628"/>
             <a:ext cx="5245100" cy="3530600"/>
-          </a:xfrm>
-          <a:prstGeom prst="rect">
-            <a:avLst/>
-          </a:prstGeom>
-        </p:spPr>
-      </p:pic>
-      <p:pic>
-        <p:nvPicPr>
-          <p:cNvPr id="7" name="Picture 6">
-            <a:extLst>
-              <a:ext uri="{FF2B5EF4-FFF2-40B4-BE49-F238E27FC236}">
-                <a16:creationId xmlns:a16="http://schemas.microsoft.com/office/drawing/2014/main" id="{077F98C6-A0E9-251F-8F28-221274AEE678}"/>
-              </a:ext>
-            </a:extLst>
-          </p:cNvPr>
-          <p:cNvPicPr>
-            <a:picLocks noChangeAspect="1"/>
-          </p:cNvPicPr>
-          <p:nvPr/>
-        </p:nvPicPr>
-        <p:blipFill>
-          <a:blip r:embed="rId3"/>
-          <a:stretch>
-            <a:fillRect/>
-          </a:stretch>
-        </p:blipFill>
-        <p:spPr>
-          <a:xfrm>
-            <a:off x="6489700" y="2968244"/>
-            <a:ext cx="5511800" cy="3530600"/>
           </a:xfrm>
           <a:prstGeom prst="rect">
             <a:avLst/>
@@ -10552,10 +10493,10 @@
       </p:sp>
       <p:pic>
         <p:nvPicPr>
-          <p:cNvPr id="4" name="Picture 3">
-            <a:extLst>
-              <a:ext uri="{FF2B5EF4-FFF2-40B4-BE49-F238E27FC236}">
-                <a16:creationId xmlns:a16="http://schemas.microsoft.com/office/drawing/2014/main" id="{DE6DE5BE-6D54-E812-A5ED-D48F664B5448}"/>
+          <p:cNvPr id="5" name="Picture 4">
+            <a:extLst>
+              <a:ext uri="{FF2B5EF4-FFF2-40B4-BE49-F238E27FC236}">
+                <a16:creationId xmlns:a16="http://schemas.microsoft.com/office/drawing/2014/main" id="{6D47E9EC-9056-2B47-ADFF-793B6FD658C6}"/>
               </a:ext>
             </a:extLst>
           </p:cNvPr>
@@ -10572,38 +10513,8 @@
         </p:blipFill>
         <p:spPr>
           <a:xfrm>
-            <a:off x="172027" y="3053588"/>
-            <a:ext cx="5245100" cy="3530600"/>
-          </a:xfrm>
-          <a:prstGeom prst="rect">
-            <a:avLst/>
-          </a:prstGeom>
-        </p:spPr>
-      </p:pic>
-      <p:pic>
-        <p:nvPicPr>
-          <p:cNvPr id="8" name="Picture 7">
-            <a:extLst>
-              <a:ext uri="{FF2B5EF4-FFF2-40B4-BE49-F238E27FC236}">
-                <a16:creationId xmlns:a16="http://schemas.microsoft.com/office/drawing/2014/main" id="{143E80EC-FBE8-6CA9-377C-09359AB11306}"/>
-              </a:ext>
-            </a:extLst>
-          </p:cNvPr>
-          <p:cNvPicPr>
-            <a:picLocks noChangeAspect="1"/>
-          </p:cNvPicPr>
-          <p:nvPr/>
-        </p:nvPicPr>
-        <p:blipFill>
-          <a:blip r:embed="rId3"/>
-          <a:stretch>
-            <a:fillRect/>
-          </a:stretch>
-        </p:blipFill>
-        <p:spPr>
-          <a:xfrm>
-            <a:off x="6352286" y="3053588"/>
-            <a:ext cx="5168900" cy="3530600"/>
+            <a:off x="319532" y="3187700"/>
+            <a:ext cx="5359400" cy="3530600"/>
           </a:xfrm>
           <a:prstGeom prst="rect">
             <a:avLst/>
@@ -11212,6 +11123,152 @@
     <p:extLst>
       <p:ext uri="{BB962C8B-B14F-4D97-AF65-F5344CB8AC3E}">
         <p14:creationId xmlns:p14="http://schemas.microsoft.com/office/powerpoint/2010/main" val="3107497647"/>
+      </p:ext>
+    </p:extLst>
+  </p:cSld>
+  <p:clrMapOvr>
+    <a:masterClrMapping/>
+  </p:clrMapOvr>
+</p:sld>
+</file>
+
+<file path=ppt/slides/slide28.xml><?xml version="1.0" encoding="utf-8"?>
+<p:sld xmlns:a="http://schemas.openxmlformats.org/drawingml/2006/main" xmlns:r="http://schemas.openxmlformats.org/officeDocument/2006/relationships" xmlns:p="http://schemas.openxmlformats.org/presentationml/2006/main">
+  <p:cSld>
+    <p:spTree>
+      <p:nvGrpSpPr>
+        <p:cNvPr id="1" name=""/>
+        <p:cNvGrpSpPr/>
+        <p:nvPr/>
+      </p:nvGrpSpPr>
+      <p:grpSpPr>
+        <a:xfrm>
+          <a:off x="0" y="0"/>
+          <a:ext cx="0" cy="0"/>
+          <a:chOff x="0" y="0"/>
+          <a:chExt cx="0" cy="0"/>
+        </a:xfrm>
+      </p:grpSpPr>
+      <p:pic>
+        <p:nvPicPr>
+          <p:cNvPr id="4" name="Picture 3">
+            <a:extLst>
+              <a:ext uri="{FF2B5EF4-FFF2-40B4-BE49-F238E27FC236}">
+                <a16:creationId xmlns:a16="http://schemas.microsoft.com/office/drawing/2014/main" id="{6DF21A5C-0E31-44F7-B8BB-9BA0136B5DC5}"/>
+              </a:ext>
+            </a:extLst>
+          </p:cNvPr>
+          <p:cNvPicPr>
+            <a:picLocks noChangeAspect="1"/>
+          </p:cNvPicPr>
+          <p:nvPr/>
+        </p:nvPicPr>
+        <p:blipFill>
+          <a:blip r:embed="rId2"/>
+          <a:stretch>
+            <a:fillRect/>
+          </a:stretch>
+        </p:blipFill>
+        <p:spPr>
+          <a:xfrm>
+            <a:off x="1932553" y="552727"/>
+            <a:ext cx="7772400" cy="5752545"/>
+          </a:xfrm>
+          <a:prstGeom prst="rect">
+            <a:avLst/>
+          </a:prstGeom>
+        </p:spPr>
+      </p:pic>
+      <p:cxnSp>
+        <p:nvCxnSpPr>
+          <p:cNvPr id="6" name="Straight Connector 5">
+            <a:extLst>
+              <a:ext uri="{FF2B5EF4-FFF2-40B4-BE49-F238E27FC236}">
+                <a16:creationId xmlns:a16="http://schemas.microsoft.com/office/drawing/2014/main" id="{E2A974FA-778D-273F-7354-214F18699FDE}"/>
+              </a:ext>
+            </a:extLst>
+          </p:cNvPr>
+          <p:cNvCxnSpPr>
+            <a:cxnSpLocks/>
+          </p:cNvCxnSpPr>
+          <p:nvPr/>
+        </p:nvCxnSpPr>
+        <p:spPr>
+          <a:xfrm>
+            <a:off x="7890641" y="5033141"/>
+            <a:ext cx="98535" cy="39414"/>
+          </a:xfrm>
+          <a:prstGeom prst="line">
+            <a:avLst/>
+          </a:prstGeom>
+          <a:ln w="12700">
+            <a:solidFill>
+              <a:schemeClr val="tx1"/>
+            </a:solidFill>
+          </a:ln>
+        </p:spPr>
+        <p:style>
+          <a:lnRef idx="1">
+            <a:schemeClr val="accent1"/>
+          </a:lnRef>
+          <a:fillRef idx="0">
+            <a:schemeClr val="accent1"/>
+          </a:fillRef>
+          <a:effectRef idx="0">
+            <a:schemeClr val="accent1"/>
+          </a:effectRef>
+          <a:fontRef idx="minor">
+            <a:schemeClr val="tx1"/>
+          </a:fontRef>
+        </p:style>
+      </p:cxnSp>
+      <p:cxnSp>
+        <p:nvCxnSpPr>
+          <p:cNvPr id="8" name="Straight Connector 7">
+            <a:extLst>
+              <a:ext uri="{FF2B5EF4-FFF2-40B4-BE49-F238E27FC236}">
+                <a16:creationId xmlns:a16="http://schemas.microsoft.com/office/drawing/2014/main" id="{F386FED5-B092-2D73-0C78-132B738ACD50}"/>
+              </a:ext>
+            </a:extLst>
+          </p:cNvPr>
+          <p:cNvCxnSpPr>
+            <a:cxnSpLocks/>
+          </p:cNvCxnSpPr>
+          <p:nvPr/>
+        </p:nvCxnSpPr>
+        <p:spPr>
+          <a:xfrm>
+            <a:off x="8046983" y="4901762"/>
+            <a:ext cx="98535" cy="39414"/>
+          </a:xfrm>
+          <a:prstGeom prst="line">
+            <a:avLst/>
+          </a:prstGeom>
+          <a:ln w="12700">
+            <a:solidFill>
+              <a:schemeClr val="tx1"/>
+            </a:solidFill>
+          </a:ln>
+        </p:spPr>
+        <p:style>
+          <a:lnRef idx="1">
+            <a:schemeClr val="accent1"/>
+          </a:lnRef>
+          <a:fillRef idx="0">
+            <a:schemeClr val="accent1"/>
+          </a:fillRef>
+          <a:effectRef idx="0">
+            <a:schemeClr val="accent1"/>
+          </a:effectRef>
+          <a:fontRef idx="minor">
+            <a:schemeClr val="tx1"/>
+          </a:fontRef>
+        </p:style>
+      </p:cxnSp>
+    </p:spTree>
+    <p:extLst>
+      <p:ext uri="{BB962C8B-B14F-4D97-AF65-F5344CB8AC3E}">
+        <p14:creationId xmlns:p14="http://schemas.microsoft.com/office/powerpoint/2010/main" val="1963170050"/>
       </p:ext>
     </p:extLst>
   </p:cSld>

</xml_diff>